<commit_message>
Upgrade to Resilience4J 2.3.0 and Spring Boot 3.5.3, regenerate presentation
- pom.xml: resilience4j.version 2.2.0 -> 2.3.0, Spring Boot 3.5.3, JaCoCo 0.8.14
- README: update badges and subtitle to Spring Boot 3.5 / Resilience4J 2.3
- Presentation: regenerate integration-architecture.pptx with updated stack info
- All 102 tests pass, JaCoCo >= 80% confirmed
</commit_message>
<xml_diff>
--- a/docs/presentations/integration-architecture/integration-architecture.pptx
+++ b/docs/presentations/integration-architecture/integration-architecture.pptx
@@ -16,13 +16,6 @@
     <p:sldId id="264" r:id="rId15"/>
     <p:sldId id="265" r:id="rId16"/>
     <p:sldId id="266" r:id="rId17"/>
-    <p:sldId id="267" r:id="rId18"/>
-    <p:sldId id="268" r:id="rId19"/>
-    <p:sldId id="269" r:id="rId20"/>
-    <p:sldId id="270" r:id="rId21"/>
-    <p:sldId id="271" r:id="rId22"/>
-    <p:sldId id="272" r:id="rId23"/>
-    <p:sldId id="273" r:id="rId24"/>
   </p:sldIdLst>
   <p:sldSz cx="9144000" cy="5143500" type="screen4x3"/>
   <p:notesSz cx="6858000" cy="9144000"/>
@@ -3143,7 +3136,7 @@
               </a:defRPr>
             </a:pPr>
             <a:r>
-              <a:t>Banking Integration Architecture</a:t>
+              <a:t>Resilience4J Demo</a:t>
             </a:r>
           </a:p>
         </p:txBody>
@@ -3213,7 +3206,7 @@
               </a:defRPr>
             </a:pPr>
             <a:r>
-              <a:t>2026-02-24 | Banking, Integration, Kafka, Oracle, CDC</a:t>
+              <a:t>2026-02-24 | Resilience4J 2.3, Spring Boot 3.5, Java 21, Fault Tolerance</a:t>
             </a:r>
           </a:p>
         </p:txBody>
@@ -3248,7 +3241,7 @@
               </a:defRPr>
             </a:pPr>
             <a:r>
-              <a:t>1/18</a:t>
+              <a:t>1/11</a:t>
             </a:r>
           </a:p>
         </p:txBody>
@@ -3309,7 +3302,7 @@
               </a:defRPr>
             </a:pPr>
             <a:r>
-              <a:t>5. Latency Factor Model</a:t>
+              <a:t>How to Run</a:t>
             </a:r>
           </a:p>
         </p:txBody>
@@ -3343,9 +3336,6 @@
                 </a:solidFill>
               </a:defRPr>
             </a:pPr>
-            <a:r>
-              <a:t>Baseline: Factor 1 = Same database (write + read, &lt; 1 ms)</a:t>
-            </a:r>
           </a:p>
         </p:txBody>
       </p:sp>
@@ -3379,7 +3369,7 @@
               </a:defRPr>
             </a:pPr>
             <a:r>
-              <a:t>• Oracle RAC: 1-2x (1-2 ms) | Data Guard: 5-50x (5-50 ms)</a:t>
+              <a:t>• git clone https://github.com/wallaceespindola/resilience4j-demo.git</a:t>
             </a:r>
           </a:p>
         </p:txBody>
@@ -3414,7 +3404,7 @@
               </a:defRPr>
             </a:pPr>
             <a:r>
-              <a:t>• GoldenGate: 2-30x (2-30 ms) | Kafka CDC: 10-100x</a:t>
+              <a:t>• cd resilience4j-demo &amp;&amp; ./mvnw spring-boot:run</a:t>
             </a:r>
           </a:p>
         </p:txBody>
@@ -3449,7 +3439,7 @@
               </a:defRPr>
             </a:pPr>
             <a:r>
-              <a:t>• gRPC Streaming: 1-10x (1-10 ms) | REST API: 2-40x</a:t>
+              <a:t>• Open http://localhost:8080 for the test console</a:t>
             </a:r>
           </a:p>
         </p:txBody>
@@ -3484,7 +3474,7 @@
               </a:defRPr>
             </a:pPr>
             <a:r>
-              <a:t>• DB Polling: 50-3,000+x (50 ms to 3+ seconds)</a:t>
+              <a:t>• Open http://localhost:8080/dashboard.html for live charts</a:t>
             </a:r>
           </a:p>
         </p:txBody>
@@ -3519,7 +3509,7 @@
               </a:defRPr>
             </a:pPr>
             <a:r>
-              <a:t>• gRPC Streaming offers lowest latency for API integration</a:t>
+              <a:t>• ./mvnw verify — 102 tests, JaCoCo &gt;= 80%</a:t>
             </a:r>
           </a:p>
         </p:txBody>
@@ -3554,7 +3544,7 @@
               </a:defRPr>
             </a:pPr>
             <a:r>
-              <a:t>10/18</a:t>
+              <a:t>10/11</a:t>
             </a:r>
           </a:p>
         </p:txBody>
@@ -3594,6 +3584,216 @@
         <p:spPr>
           <a:xfrm>
             <a:off x="457200" y="365760"/>
+            <a:ext cx="8229600" cy="548640"/>
+          </a:xfrm>
+          <a:prstGeom prst="rect">
+            <a:avLst/>
+          </a:prstGeom>
+          <a:noFill/>
+        </p:spPr>
+        <p:txBody>
+          <a:bodyPr wrap="none">
+            <a:spAutoFit/>
+          </a:bodyPr>
+          <a:lstStyle/>
+          <a:p>
+            <a:pPr>
+              <a:defRPr sz="4000" b="1">
+                <a:solidFill>
+                  <a:srgbClr val="58A6FF"/>
+                </a:solidFill>
+              </a:defRPr>
+            </a:pPr>
+            <a:r>
+              <a:t>Key Takeaways</a:t>
+            </a:r>
+          </a:p>
+        </p:txBody>
+      </p:sp>
+      <p:sp>
+        <p:nvSpPr>
+          <p:cNvPr id="3" name="TextBox 2"/>
+          <p:cNvSpPr txBox="1"/>
+          <p:nvPr/>
+        </p:nvSpPr>
+        <p:spPr>
+          <a:xfrm>
+            <a:off x="914400" y="1188720"/>
+            <a:ext cx="7772400" cy="457200"/>
+          </a:xfrm>
+          <a:prstGeom prst="rect">
+            <a:avLst/>
+          </a:prstGeom>
+          <a:noFill/>
+        </p:spPr>
+        <p:txBody>
+          <a:bodyPr wrap="square">
+            <a:spAutoFit/>
+          </a:bodyPr>
+          <a:lstStyle/>
+          <a:p>
+            <a:pPr>
+              <a:defRPr sz="1600">
+                <a:solidFill>
+                  <a:srgbClr val="E6EDF3"/>
+                </a:solidFill>
+              </a:defRPr>
+            </a:pPr>
+            <a:r>
+              <a:t>✓ Six R4J modules in one project with a shared bulk-transfer scenario</a:t>
+            </a:r>
+          </a:p>
+        </p:txBody>
+      </p:sp>
+      <p:sp>
+        <p:nvSpPr>
+          <p:cNvPr id="4" name="TextBox 3"/>
+          <p:cNvSpPr txBox="1"/>
+          <p:nvPr/>
+        </p:nvSpPr>
+        <p:spPr>
+          <a:xfrm>
+            <a:off x="914400" y="1783080"/>
+            <a:ext cx="7772400" cy="457200"/>
+          </a:xfrm>
+          <a:prstGeom prst="rect">
+            <a:avLst/>
+          </a:prstGeom>
+          <a:noFill/>
+        </p:spPr>
+        <p:txBody>
+          <a:bodyPr wrap="square">
+            <a:spAutoFit/>
+          </a:bodyPr>
+          <a:lstStyle/>
+          <a:p>
+            <a:pPr>
+              <a:defRPr sz="1600">
+                <a:solidFill>
+                  <a:srgbClr val="E6EDF3"/>
+                </a:solidFill>
+              </a:defRPr>
+            </a:pPr>
+            <a:r>
+              <a:t>✓ Fault injection at runtime — no restarts needed</a:t>
+            </a:r>
+          </a:p>
+        </p:txBody>
+      </p:sp>
+      <p:sp>
+        <p:nvSpPr>
+          <p:cNvPr id="5" name="TextBox 4"/>
+          <p:cNvSpPr txBox="1"/>
+          <p:nvPr/>
+        </p:nvSpPr>
+        <p:spPr>
+          <a:xfrm>
+            <a:off x="914400" y="2377440"/>
+            <a:ext cx="7772400" cy="457200"/>
+          </a:xfrm>
+          <a:prstGeom prst="rect">
+            <a:avLst/>
+          </a:prstGeom>
+          <a:noFill/>
+        </p:spPr>
+        <p:txBody>
+          <a:bodyPr wrap="square">
+            <a:spAutoFit/>
+          </a:bodyPr>
+          <a:lstStyle/>
+          <a:p>
+            <a:pPr>
+              <a:defRPr sz="1600">
+                <a:solidFill>
+                  <a:srgbClr val="E6EDF3"/>
+                </a:solidFill>
+              </a:defRPr>
+            </a:pPr>
+            <a:r>
+              <a:t>✓ Live dashboard with Chart.js polls every 2 s</a:t>
+            </a:r>
+          </a:p>
+        </p:txBody>
+      </p:sp>
+      <p:sp>
+        <p:nvSpPr>
+          <p:cNvPr id="6" name="TextBox 5"/>
+          <p:cNvSpPr txBox="1"/>
+          <p:nvPr/>
+        </p:nvSpPr>
+        <p:spPr>
+          <a:xfrm>
+            <a:off x="914400" y="2971800"/>
+            <a:ext cx="7772400" cy="457200"/>
+          </a:xfrm>
+          <a:prstGeom prst="rect">
+            <a:avLst/>
+          </a:prstGeom>
+          <a:noFill/>
+        </p:spPr>
+        <p:txBody>
+          <a:bodyPr wrap="square">
+            <a:spAutoFit/>
+          </a:bodyPr>
+          <a:lstStyle/>
+          <a:p>
+            <a:pPr>
+              <a:defRPr sz="1600">
+                <a:solidFill>
+                  <a:srgbClr val="E6EDF3"/>
+                </a:solidFill>
+              </a:defRPr>
+            </a:pPr>
+            <a:r>
+              <a:t>✓ 102 tests, ~85% instruction coverage enforced by JaCoCo</a:t>
+            </a:r>
+          </a:p>
+        </p:txBody>
+      </p:sp>
+      <p:sp>
+        <p:nvSpPr>
+          <p:cNvPr id="7" name="TextBox 6"/>
+          <p:cNvSpPr txBox="1"/>
+          <p:nvPr/>
+        </p:nvSpPr>
+        <p:spPr>
+          <a:xfrm>
+            <a:off x="914400" y="3566160"/>
+            <a:ext cx="7772400" cy="457200"/>
+          </a:xfrm>
+          <a:prstGeom prst="rect">
+            <a:avLst/>
+          </a:prstGeom>
+          <a:noFill/>
+        </p:spPr>
+        <p:txBody>
+          <a:bodyPr wrap="square">
+            <a:spAutoFit/>
+          </a:bodyPr>
+          <a:lstStyle/>
+          <a:p>
+            <a:pPr>
+              <a:defRPr sz="1600">
+                <a:solidFill>
+                  <a:srgbClr val="E6EDF3"/>
+                </a:solidFill>
+              </a:defRPr>
+            </a:pPr>
+            <a:r>
+              <a:t>✓ Resilience4J 2.3.0 + Spring Boot 3.5.3 + Java 21</a:t>
+            </a:r>
+          </a:p>
+        </p:txBody>
+      </p:sp>
+      <p:sp>
+        <p:nvSpPr>
+          <p:cNvPr id="8" name="TextBox 7"/>
+          <p:cNvSpPr txBox="1"/>
+          <p:nvPr/>
+        </p:nvSpPr>
+        <p:spPr>
+          <a:xfrm>
+            <a:off x="457200" y="4114800"/>
             <a:ext cx="8229600" cy="731520"/>
           </a:xfrm>
           <a:prstGeom prst="rect">
@@ -3602,202 +3802,27 @@
           <a:noFill/>
         </p:spPr>
         <p:txBody>
-          <a:bodyPr wrap="none">
-            <a:spAutoFit/>
-          </a:bodyPr>
-          <a:lstStyle/>
-          <a:p>
-            <a:pPr>
-              <a:defRPr sz="4000" b="1">
-                <a:solidFill>
-                  <a:srgbClr val="58A6FF"/>
-                </a:solidFill>
-              </a:defRPr>
-            </a:pPr>
-            <a:r>
-              <a:t>6. Banking Industry Reality</a:t>
-            </a:r>
-          </a:p>
-        </p:txBody>
-      </p:sp>
-      <p:sp>
-        <p:nvSpPr>
-          <p:cNvPr id="3" name="TextBox 2"/>
-          <p:cNvSpPr txBox="1"/>
-          <p:nvPr/>
-        </p:nvSpPr>
-        <p:spPr>
-          <a:xfrm>
-            <a:off x="457200" y="1280160"/>
-            <a:ext cx="8229600" cy="1828800"/>
-          </a:xfrm>
-          <a:prstGeom prst="rect">
-            <a:avLst/>
-          </a:prstGeom>
-          <a:noFill/>
-        </p:spPr>
-        <p:txBody>
           <a:bodyPr wrap="square">
             <a:spAutoFit/>
           </a:bodyPr>
           <a:lstStyle/>
           <a:p>
-            <a:pPr>
-              <a:defRPr sz="1800">
-                <a:solidFill>
-                  <a:srgbClr val="E6EDF3"/>
-                </a:solidFill>
-              </a:defRPr>
-            </a:pPr>
-            <a:r>
-              <a:t>Banks optimize for four core principles:</a:t>
-            </a:r>
-          </a:p>
-        </p:txBody>
-      </p:sp>
-      <p:sp>
-        <p:nvSpPr>
-          <p:cNvPr id="4" name="TextBox 3"/>
-          <p:cNvSpPr txBox="1"/>
-          <p:nvPr/>
-        </p:nvSpPr>
-        <p:spPr>
-          <a:xfrm>
-            <a:off x="914400" y="3291840"/>
-            <a:ext cx="7772400" cy="274320"/>
-          </a:xfrm>
-          <a:prstGeom prst="rect">
-            <a:avLst/>
-          </a:prstGeom>
-          <a:noFill/>
-        </p:spPr>
-        <p:txBody>
-          <a:bodyPr wrap="none">
-            <a:spAutoFit/>
-          </a:bodyPr>
-          <a:lstStyle/>
-          <a:p>
-            <a:pPr>
+            <a:pPr algn="ctr">
               <a:defRPr sz="1400">
                 <a:solidFill>
-                  <a:srgbClr val="E6EDF3"/>
-                </a:solidFill>
-              </a:defRPr>
-            </a:pPr>
-            <a:r>
-              <a:t>• Determinism - predictable, reproducible outcomes</a:t>
-            </a:r>
-          </a:p>
-        </p:txBody>
-      </p:sp>
-      <p:sp>
-        <p:nvSpPr>
-          <p:cNvPr id="5" name="TextBox 4"/>
-          <p:cNvSpPr txBox="1"/>
-          <p:nvPr/>
-        </p:nvSpPr>
-        <p:spPr>
-          <a:xfrm>
-            <a:off x="914400" y="3611880"/>
-            <a:ext cx="7772400" cy="274320"/>
-          </a:xfrm>
-          <a:prstGeom prst="rect">
-            <a:avLst/>
-          </a:prstGeom>
-          <a:noFill/>
-        </p:spPr>
-        <p:txBody>
-          <a:bodyPr wrap="none">
-            <a:spAutoFit/>
-          </a:bodyPr>
-          <a:lstStyle/>
-          <a:p>
-            <a:pPr>
-              <a:defRPr sz="1400">
-                <a:solidFill>
-                  <a:srgbClr val="E6EDF3"/>
-                </a:solidFill>
-              </a:defRPr>
-            </a:pPr>
-            <a:r>
-              <a:t>• Auditability - full traceability of every transaction</a:t>
-            </a:r>
-          </a:p>
-        </p:txBody>
-      </p:sp>
-      <p:sp>
-        <p:nvSpPr>
-          <p:cNvPr id="6" name="TextBox 5"/>
-          <p:cNvSpPr txBox="1"/>
-          <p:nvPr/>
-        </p:nvSpPr>
-        <p:spPr>
-          <a:xfrm>
-            <a:off x="914400" y="3931920"/>
-            <a:ext cx="7772400" cy="274320"/>
-          </a:xfrm>
-          <a:prstGeom prst="rect">
-            <a:avLst/>
-          </a:prstGeom>
-          <a:noFill/>
-        </p:spPr>
-        <p:txBody>
-          <a:bodyPr wrap="none">
-            <a:spAutoFit/>
-          </a:bodyPr>
-          <a:lstStyle/>
-          <a:p>
-            <a:pPr>
-              <a:defRPr sz="1400">
-                <a:solidFill>
-                  <a:srgbClr val="E6EDF3"/>
-                </a:solidFill>
-              </a:defRPr>
-            </a:pPr>
-            <a:r>
-              <a:t>• Replayability - reconstruct state from event history</a:t>
-            </a:r>
-          </a:p>
-        </p:txBody>
-      </p:sp>
-      <p:sp>
-        <p:nvSpPr>
-          <p:cNvPr id="7" name="TextBox 6"/>
-          <p:cNvSpPr txBox="1"/>
-          <p:nvPr/>
-        </p:nvSpPr>
-        <p:spPr>
-          <a:xfrm>
-            <a:off x="914400" y="4251959"/>
-            <a:ext cx="7772400" cy="274320"/>
-          </a:xfrm>
-          <a:prstGeom prst="rect">
-            <a:avLst/>
-          </a:prstGeom>
-          <a:noFill/>
-        </p:spPr>
-        <p:txBody>
-          <a:bodyPr wrap="none">
-            <a:spAutoFit/>
-          </a:bodyPr>
-          <a:lstStyle/>
-          <a:p>
-            <a:pPr>
-              <a:defRPr sz="1400">
-                <a:solidFill>
-                  <a:srgbClr val="E6EDF3"/>
-                </a:solidFill>
-              </a:defRPr>
-            </a:pPr>
-            <a:r>
-              <a:t>• Isolation - failure containment, no cascading</a:t>
-            </a:r>
-          </a:p>
-        </p:txBody>
-      </p:sp>
-      <p:sp>
-        <p:nvSpPr>
-          <p:cNvPr id="8" name="TextBox 7"/>
+                  <a:srgbClr val="79C0FF"/>
+                </a:solidFill>
+              </a:defRPr>
+            </a:pPr>
+            <a:r>
+              <a:t>Wallace Espindola | github.com/wallaceespindola | linkedin.com/in/wallaceespindola</a:t>
+            </a:r>
+          </a:p>
+        </p:txBody>
+      </p:sp>
+      <p:sp>
+        <p:nvSpPr>
+          <p:cNvPr id="9" name="TextBox 8"/>
           <p:cNvSpPr txBox="1"/>
           <p:nvPr/>
         </p:nvSpPr>
@@ -3825,1911 +3850,7 @@
               </a:defRPr>
             </a:pPr>
             <a:r>
-              <a:t>11/18</a:t>
-            </a:r>
-          </a:p>
-        </p:txBody>
-      </p:sp>
-    </p:spTree>
-  </p:cSld>
-  <p:clrMapOvr>
-    <a:masterClrMapping/>
-  </p:clrMapOvr>
-</p:sld>
-</file>
-
-<file path=ppt/slides/slide12.xml><?xml version="1.0" encoding="utf-8"?>
-<p:sld xmlns:a="http://schemas.openxmlformats.org/drawingml/2006/main" xmlns:p="http://schemas.openxmlformats.org/presentationml/2006/main" xmlns:r="http://schemas.openxmlformats.org/officeDocument/2006/relationships">
-  <p:cSld>
-    <p:bg>
-      <p:bgPr>
-        <a:solidFill>
-          <a:srgbClr val="0D1117"/>
-        </a:solidFill>
-        <a:effectLst/>
-      </p:bgPr>
-    </p:bg>
-    <p:spTree>
-      <p:nvGrpSpPr>
-        <p:cNvPr id="1" name=""/>
-        <p:cNvGrpSpPr/>
-        <p:nvPr/>
-      </p:nvGrpSpPr>
-      <p:grpSpPr/>
-      <p:sp>
-        <p:nvSpPr>
-          <p:cNvPr id="2" name="TextBox 1"/>
-          <p:cNvSpPr txBox="1"/>
-          <p:nvPr/>
-        </p:nvSpPr>
-        <p:spPr>
-          <a:xfrm>
-            <a:off x="457200" y="365760"/>
-            <a:ext cx="8229600" cy="731520"/>
-          </a:xfrm>
-          <a:prstGeom prst="rect">
-            <a:avLst/>
-          </a:prstGeom>
-          <a:noFill/>
-        </p:spPr>
-        <p:txBody>
-          <a:bodyPr wrap="none">
-            <a:spAutoFit/>
-          </a:bodyPr>
-          <a:lstStyle/>
-          <a:p>
-            <a:pPr>
-              <a:defRPr sz="4000" b="1">
-                <a:solidFill>
-                  <a:srgbClr val="58A6FF"/>
-                </a:solidFill>
-              </a:defRPr>
-            </a:pPr>
-            <a:r>
-              <a:t>Most Typical Banking Stack</a:t>
-            </a:r>
-          </a:p>
-        </p:txBody>
-      </p:sp>
-      <p:sp>
-        <p:nvSpPr>
-          <p:cNvPr id="3" name="TextBox 2"/>
-          <p:cNvSpPr txBox="1"/>
-          <p:nvPr/>
-        </p:nvSpPr>
-        <p:spPr>
-          <a:xfrm>
-            <a:off x="457200" y="1280160"/>
-            <a:ext cx="8229600" cy="1828800"/>
-          </a:xfrm>
-          <a:prstGeom prst="rect">
-            <a:avLst/>
-          </a:prstGeom>
-          <a:noFill/>
-        </p:spPr>
-        <p:txBody>
-          <a:bodyPr wrap="square">
-            <a:spAutoFit/>
-          </a:bodyPr>
-          <a:lstStyle/>
-          <a:p>
-            <a:pPr>
-              <a:defRPr sz="1800">
-                <a:solidFill>
-                  <a:srgbClr val="E6EDF3"/>
-                </a:solidFill>
-              </a:defRPr>
-            </a:pPr>
-            <a:r>
-              <a:t>Three layers form the foundation:</a:t>
-            </a:r>
-          </a:p>
-        </p:txBody>
-      </p:sp>
-      <p:sp>
-        <p:nvSpPr>
-          <p:cNvPr id="4" name="TextBox 3"/>
-          <p:cNvSpPr txBox="1"/>
-          <p:nvPr/>
-        </p:nvSpPr>
-        <p:spPr>
-          <a:xfrm>
-            <a:off x="914400" y="3291840"/>
-            <a:ext cx="7772400" cy="274320"/>
-          </a:xfrm>
-          <a:prstGeom prst="rect">
-            <a:avLst/>
-          </a:prstGeom>
-          <a:noFill/>
-        </p:spPr>
-        <p:txBody>
-          <a:bodyPr wrap="none">
-            <a:spAutoFit/>
-          </a:bodyPr>
-          <a:lstStyle/>
-          <a:p>
-            <a:pPr>
-              <a:defRPr sz="1400">
-                <a:solidFill>
-                  <a:srgbClr val="E6EDF3"/>
-                </a:solidFill>
-              </a:defRPr>
-            </a:pPr>
-            <a:r>
-              <a:t>• System of Record: Oracle Database + Data Guard</a:t>
-            </a:r>
-          </a:p>
-        </p:txBody>
-      </p:sp>
-      <p:sp>
-        <p:nvSpPr>
-          <p:cNvPr id="5" name="TextBox 4"/>
-          <p:cNvSpPr txBox="1"/>
-          <p:nvPr/>
-        </p:nvSpPr>
-        <p:spPr>
-          <a:xfrm>
-            <a:off x="914400" y="3611880"/>
-            <a:ext cx="7772400" cy="274320"/>
-          </a:xfrm>
-          <a:prstGeom prst="rect">
-            <a:avLst/>
-          </a:prstGeom>
-          <a:noFill/>
-        </p:spPr>
-        <p:txBody>
-          <a:bodyPr wrap="none">
-            <a:spAutoFit/>
-          </a:bodyPr>
-          <a:lstStyle/>
-          <a:p>
-            <a:pPr>
-              <a:defRPr sz="1400">
-                <a:solidFill>
-                  <a:srgbClr val="E6EDF3"/>
-                </a:solidFill>
-              </a:defRPr>
-            </a:pPr>
-            <a:r>
-              <a:t>• Integration: GoldenGate / CDC + Kafka backbone</a:t>
-            </a:r>
-          </a:p>
-        </p:txBody>
-      </p:sp>
-      <p:sp>
-        <p:nvSpPr>
-          <p:cNvPr id="6" name="TextBox 5"/>
-          <p:cNvSpPr txBox="1"/>
-          <p:nvPr/>
-        </p:nvSpPr>
-        <p:spPr>
-          <a:xfrm>
-            <a:off x="914400" y="3931920"/>
-            <a:ext cx="7772400" cy="274320"/>
-          </a:xfrm>
-          <a:prstGeom prst="rect">
-            <a:avLst/>
-          </a:prstGeom>
-          <a:noFill/>
-        </p:spPr>
-        <p:txBody>
-          <a:bodyPr wrap="none">
-            <a:spAutoFit/>
-          </a:bodyPr>
-          <a:lstStyle/>
-          <a:p>
-            <a:pPr>
-              <a:defRPr sz="1400">
-                <a:solidFill>
-                  <a:srgbClr val="E6EDF3"/>
-                </a:solidFill>
-              </a:defRPr>
-            </a:pPr>
-            <a:r>
-              <a:t>• Consumption: APIs, Fraud systems, Analytics, Reporting</a:t>
-            </a:r>
-          </a:p>
-        </p:txBody>
-      </p:sp>
-      <p:sp>
-        <p:nvSpPr>
-          <p:cNvPr id="7" name="TextBox 6"/>
-          <p:cNvSpPr txBox="1"/>
-          <p:nvPr/>
-        </p:nvSpPr>
-        <p:spPr>
-          <a:xfrm>
-            <a:off x="8229600" y="4846320"/>
-            <a:ext cx="731520" cy="228600"/>
-          </a:xfrm>
-          <a:prstGeom prst="rect">
-            <a:avLst/>
-          </a:prstGeom>
-          <a:noFill/>
-        </p:spPr>
-        <p:txBody>
-          <a:bodyPr wrap="none">
-            <a:spAutoFit/>
-          </a:bodyPr>
-          <a:lstStyle/>
-          <a:p>
-            <a:pPr algn="r">
-              <a:defRPr sz="800">
-                <a:solidFill>
-                  <a:srgbClr val="E6EDF3"/>
-                </a:solidFill>
-              </a:defRPr>
-            </a:pPr>
-            <a:r>
-              <a:t>12/18</a:t>
-            </a:r>
-          </a:p>
-        </p:txBody>
-      </p:sp>
-    </p:spTree>
-  </p:cSld>
-  <p:clrMapOvr>
-    <a:masterClrMapping/>
-  </p:clrMapOvr>
-</p:sld>
-</file>
-
-<file path=ppt/slides/slide13.xml><?xml version="1.0" encoding="utf-8"?>
-<p:sld xmlns:a="http://schemas.openxmlformats.org/drawingml/2006/main" xmlns:p="http://schemas.openxmlformats.org/presentationml/2006/main" xmlns:r="http://schemas.openxmlformats.org/officeDocument/2006/relationships">
-  <p:cSld>
-    <p:bg>
-      <p:bgPr>
-        <a:solidFill>
-          <a:srgbClr val="0D1117"/>
-        </a:solidFill>
-        <a:effectLst/>
-      </p:bgPr>
-    </p:bg>
-    <p:spTree>
-      <p:nvGrpSpPr>
-        <p:cNvPr id="1" name=""/>
-        <p:cNvGrpSpPr/>
-        <p:nvPr/>
-      </p:nvGrpSpPr>
-      <p:grpSpPr/>
-      <p:sp>
-        <p:nvSpPr>
-          <p:cNvPr id="2" name="TextBox 1"/>
-          <p:cNvSpPr txBox="1"/>
-          <p:nvPr/>
-        </p:nvSpPr>
-        <p:spPr>
-          <a:xfrm>
-            <a:off x="457200" y="365760"/>
-            <a:ext cx="8229600" cy="731520"/>
-          </a:xfrm>
-          <a:prstGeom prst="rect">
-            <a:avLst/>
-          </a:prstGeom>
-          <a:noFill/>
-        </p:spPr>
-        <p:txBody>
-          <a:bodyPr wrap="none">
-            <a:spAutoFit/>
-          </a:bodyPr>
-          <a:lstStyle/>
-          <a:p>
-            <a:pPr>
-              <a:defRPr sz="4000" b="1">
-                <a:solidFill>
-                  <a:srgbClr val="58A6FF"/>
-                </a:solidFill>
-              </a:defRPr>
-            </a:pPr>
-            <a:r>
-              <a:t>7. Banking Integration Maturity Model</a:t>
-            </a:r>
-          </a:p>
-        </p:txBody>
-      </p:sp>
-      <p:sp>
-        <p:nvSpPr>
-          <p:cNvPr id="3" name="TextBox 2"/>
-          <p:cNvSpPr txBox="1"/>
-          <p:nvPr/>
-        </p:nvSpPr>
-        <p:spPr>
-          <a:xfrm>
-            <a:off x="457200" y="1280160"/>
-            <a:ext cx="8229600" cy="1828800"/>
-          </a:xfrm>
-          <a:prstGeom prst="rect">
-            <a:avLst/>
-          </a:prstGeom>
-          <a:noFill/>
-        </p:spPr>
-        <p:txBody>
-          <a:bodyPr wrap="square">
-            <a:spAutoFit/>
-          </a:bodyPr>
-          <a:lstStyle/>
-          <a:p>
-            <a:pPr>
-              <a:defRPr sz="1800">
-                <a:solidFill>
-                  <a:srgbClr val="E6EDF3"/>
-                </a:solidFill>
-              </a:defRPr>
-            </a:pPr>
-            <a:r>
-              <a:t>Six levels of integration maturity:</a:t>
-            </a:r>
-          </a:p>
-        </p:txBody>
-      </p:sp>
-      <p:sp>
-        <p:nvSpPr>
-          <p:cNvPr id="4" name="TextBox 3"/>
-          <p:cNvSpPr txBox="1"/>
-          <p:nvPr/>
-        </p:nvSpPr>
-        <p:spPr>
-          <a:xfrm>
-            <a:off x="914400" y="3291840"/>
-            <a:ext cx="7772400" cy="274320"/>
-          </a:xfrm>
-          <a:prstGeom prst="rect">
-            <a:avLst/>
-          </a:prstGeom>
-          <a:noFill/>
-        </p:spPr>
-        <p:txBody>
-          <a:bodyPr wrap="none">
-            <a:spAutoFit/>
-          </a:bodyPr>
-          <a:lstStyle/>
-          <a:p>
-            <a:pPr>
-              <a:defRPr sz="1400">
-                <a:solidFill>
-                  <a:srgbClr val="E6EDF3"/>
-                </a:solidFill>
-              </a:defRPr>
-            </a:pPr>
-            <a:r>
-              <a:t>• Level 0: Shared DB (simple, tightly coupled)</a:t>
-            </a:r>
-          </a:p>
-        </p:txBody>
-      </p:sp>
-      <p:sp>
-        <p:nvSpPr>
-          <p:cNvPr id="5" name="TextBox 4"/>
-          <p:cNvSpPr txBox="1"/>
-          <p:nvPr/>
-        </p:nvSpPr>
-        <p:spPr>
-          <a:xfrm>
-            <a:off x="914400" y="3611880"/>
-            <a:ext cx="7772400" cy="274320"/>
-          </a:xfrm>
-          <a:prstGeom prst="rect">
-            <a:avLst/>
-          </a:prstGeom>
-          <a:noFill/>
-        </p:spPr>
-        <p:txBody>
-          <a:bodyPr wrap="none">
-            <a:spAutoFit/>
-          </a:bodyPr>
-          <a:lstStyle/>
-          <a:p>
-            <a:pPr>
-              <a:defRPr sz="1400">
-                <a:solidFill>
-                  <a:srgbClr val="E6EDF3"/>
-                </a:solidFill>
-              </a:defRPr>
-            </a:pPr>
-            <a:r>
-              <a:t>• Level 1: DB Replication (Data Guard HA/DR)</a:t>
-            </a:r>
-          </a:p>
-        </p:txBody>
-      </p:sp>
-      <p:sp>
-        <p:nvSpPr>
-          <p:cNvPr id="6" name="TextBox 5"/>
-          <p:cNvSpPr txBox="1"/>
-          <p:nvPr/>
-        </p:nvSpPr>
-        <p:spPr>
-          <a:xfrm>
-            <a:off x="914400" y="3931920"/>
-            <a:ext cx="7772400" cy="274320"/>
-          </a:xfrm>
-          <a:prstGeom prst="rect">
-            <a:avLst/>
-          </a:prstGeom>
-          <a:noFill/>
-        </p:spPr>
-        <p:txBody>
-          <a:bodyPr wrap="none">
-            <a:spAutoFit/>
-          </a:bodyPr>
-          <a:lstStyle/>
-          <a:p>
-            <a:pPr>
-              <a:defRPr sz="1400">
-                <a:solidFill>
-                  <a:srgbClr val="E6EDF3"/>
-                </a:solidFill>
-              </a:defRPr>
-            </a:pPr>
-            <a:r>
-              <a:t>• Level 2: CDC Integration (Oracle -&gt; Kafka -&gt; Consumers)</a:t>
-            </a:r>
-          </a:p>
-        </p:txBody>
-      </p:sp>
-      <p:sp>
-        <p:nvSpPr>
-          <p:cNvPr id="7" name="TextBox 6"/>
-          <p:cNvSpPr txBox="1"/>
-          <p:nvPr/>
-        </p:nvSpPr>
-        <p:spPr>
-          <a:xfrm>
-            <a:off x="914400" y="4251959"/>
-            <a:ext cx="7772400" cy="274320"/>
-          </a:xfrm>
-          <a:prstGeom prst="rect">
-            <a:avLst/>
-          </a:prstGeom>
-          <a:noFill/>
-        </p:spPr>
-        <p:txBody>
-          <a:bodyPr wrap="none">
-            <a:spAutoFit/>
-          </a:bodyPr>
-          <a:lstStyle/>
-          <a:p>
-            <a:pPr>
-              <a:defRPr sz="1400">
-                <a:solidFill>
-                  <a:srgbClr val="E6EDF3"/>
-                </a:solidFill>
-              </a:defRPr>
-            </a:pPr>
-            <a:r>
-              <a:t>• Level 3: Event Backbone (enterprise streaming)</a:t>
-            </a:r>
-          </a:p>
-        </p:txBody>
-      </p:sp>
-      <p:sp>
-        <p:nvSpPr>
-          <p:cNvPr id="8" name="TextBox 7"/>
-          <p:cNvSpPr txBox="1"/>
-          <p:nvPr/>
-        </p:nvSpPr>
-        <p:spPr>
-          <a:xfrm>
-            <a:off x="914400" y="4571999"/>
-            <a:ext cx="7772400" cy="274320"/>
-          </a:xfrm>
-          <a:prstGeom prst="rect">
-            <a:avLst/>
-          </a:prstGeom>
-          <a:noFill/>
-        </p:spPr>
-        <p:txBody>
-          <a:bodyPr wrap="none">
-            <a:spAutoFit/>
-          </a:bodyPr>
-          <a:lstStyle/>
-          <a:p>
-            <a:pPr>
-              <a:defRPr sz="1400">
-                <a:solidFill>
-                  <a:srgbClr val="E6EDF3"/>
-                </a:solidFill>
-              </a:defRPr>
-            </a:pPr>
-            <a:r>
-              <a:t>• Level 4-5: Domain Events / Streaming Bank (event-driven)</a:t>
-            </a:r>
-          </a:p>
-        </p:txBody>
-      </p:sp>
-      <p:sp>
-        <p:nvSpPr>
-          <p:cNvPr id="9" name="TextBox 8"/>
-          <p:cNvSpPr txBox="1"/>
-          <p:nvPr/>
-        </p:nvSpPr>
-        <p:spPr>
-          <a:xfrm>
-            <a:off x="8229600" y="4846320"/>
-            <a:ext cx="731520" cy="228600"/>
-          </a:xfrm>
-          <a:prstGeom prst="rect">
-            <a:avLst/>
-          </a:prstGeom>
-          <a:noFill/>
-        </p:spPr>
-        <p:txBody>
-          <a:bodyPr wrap="none">
-            <a:spAutoFit/>
-          </a:bodyPr>
-          <a:lstStyle/>
-          <a:p>
-            <a:pPr algn="r">
-              <a:defRPr sz="800">
-                <a:solidFill>
-                  <a:srgbClr val="E6EDF3"/>
-                </a:solidFill>
-              </a:defRPr>
-            </a:pPr>
-            <a:r>
-              <a:t>13/18</a:t>
-            </a:r>
-          </a:p>
-        </p:txBody>
-      </p:sp>
-    </p:spTree>
-  </p:cSld>
-  <p:clrMapOvr>
-    <a:masterClrMapping/>
-  </p:clrMapOvr>
-</p:sld>
-</file>
-
-<file path=ppt/slides/slide14.xml><?xml version="1.0" encoding="utf-8"?>
-<p:sld xmlns:a="http://schemas.openxmlformats.org/drawingml/2006/main" xmlns:p="http://schemas.openxmlformats.org/presentationml/2006/main" xmlns:r="http://schemas.openxmlformats.org/officeDocument/2006/relationships">
-  <p:cSld>
-    <p:bg>
-      <p:bgPr>
-        <a:solidFill>
-          <a:srgbClr val="0D1117"/>
-        </a:solidFill>
-        <a:effectLst/>
-      </p:bgPr>
-    </p:bg>
-    <p:spTree>
-      <p:nvGrpSpPr>
-        <p:cNvPr id="1" name=""/>
-        <p:cNvGrpSpPr/>
-        <p:nvPr/>
-      </p:nvGrpSpPr>
-      <p:grpSpPr/>
-      <p:sp>
-        <p:nvSpPr>
-          <p:cNvPr id="2" name="TextBox 1"/>
-          <p:cNvSpPr txBox="1"/>
-          <p:nvPr/>
-        </p:nvSpPr>
-        <p:spPr>
-          <a:xfrm>
-            <a:off x="457200" y="365760"/>
-            <a:ext cx="8229600" cy="731520"/>
-          </a:xfrm>
-          <a:prstGeom prst="rect">
-            <a:avLst/>
-          </a:prstGeom>
-          <a:noFill/>
-        </p:spPr>
-        <p:txBody>
-          <a:bodyPr wrap="none">
-            <a:spAutoFit/>
-          </a:bodyPr>
-          <a:lstStyle/>
-          <a:p>
-            <a:pPr>
-              <a:defRPr sz="4000" b="1">
-                <a:solidFill>
-                  <a:srgbClr val="58A6FF"/>
-                </a:solidFill>
-              </a:defRPr>
-            </a:pPr>
-            <a:r>
-              <a:t>8. Five Banking Architecture Mistakes</a:t>
-            </a:r>
-          </a:p>
-        </p:txBody>
-      </p:sp>
-      <p:sp>
-        <p:nvSpPr>
-          <p:cNvPr id="3" name="TextBox 2"/>
-          <p:cNvSpPr txBox="1"/>
-          <p:nvPr/>
-        </p:nvSpPr>
-        <p:spPr>
-          <a:xfrm>
-            <a:off x="457200" y="1280160"/>
-            <a:ext cx="8229600" cy="1828800"/>
-          </a:xfrm>
-          <a:prstGeom prst="rect">
-            <a:avLst/>
-          </a:prstGeom>
-          <a:noFill/>
-        </p:spPr>
-        <p:txBody>
-          <a:bodyPr wrap="square">
-            <a:spAutoFit/>
-          </a:bodyPr>
-          <a:lstStyle/>
-          <a:p>
-            <a:pPr>
-              <a:defRPr sz="1800">
-                <a:solidFill>
-                  <a:srgbClr val="E6EDF3"/>
-                </a:solidFill>
-              </a:defRPr>
-            </a:pPr>
-            <a:r>
-              <a:t>Common pitfalls and their solutions:</a:t>
-            </a:r>
-          </a:p>
-        </p:txBody>
-      </p:sp>
-      <p:sp>
-        <p:nvSpPr>
-          <p:cNvPr id="4" name="TextBox 3"/>
-          <p:cNvSpPr txBox="1"/>
-          <p:nvPr/>
-        </p:nvSpPr>
-        <p:spPr>
-          <a:xfrm>
-            <a:off x="914400" y="3291840"/>
-            <a:ext cx="7772400" cy="274320"/>
-          </a:xfrm>
-          <a:prstGeom prst="rect">
-            <a:avLst/>
-          </a:prstGeom>
-          <a:noFill/>
-        </p:spPr>
-        <p:txBody>
-          <a:bodyPr wrap="none">
-            <a:spAutoFit/>
-          </a:bodyPr>
-          <a:lstStyle/>
-          <a:p>
-            <a:pPr>
-              <a:defRPr sz="1400">
-                <a:solidFill>
-                  <a:srgbClr val="E6EDF3"/>
-                </a:solidFill>
-              </a:defRPr>
-            </a:pPr>
-            <a:r>
-              <a:t>• 1. Dual writes without coordination -&gt; inconsistency</a:t>
-            </a:r>
-          </a:p>
-        </p:txBody>
-      </p:sp>
-      <p:sp>
-        <p:nvSpPr>
-          <p:cNvPr id="5" name="TextBox 4"/>
-          <p:cNvSpPr txBox="1"/>
-          <p:nvPr/>
-        </p:nvSpPr>
-        <p:spPr>
-          <a:xfrm>
-            <a:off x="914400" y="3611880"/>
-            <a:ext cx="7772400" cy="274320"/>
-          </a:xfrm>
-          <a:prstGeom prst="rect">
-            <a:avLst/>
-          </a:prstGeom>
-          <a:noFill/>
-        </p:spPr>
-        <p:txBody>
-          <a:bodyPr wrap="none">
-            <a:spAutoFit/>
-          </a:bodyPr>
-          <a:lstStyle/>
-          <a:p>
-            <a:pPr>
-              <a:defRPr sz="1400">
-                <a:solidFill>
-                  <a:srgbClr val="E6EDF3"/>
-                </a:solidFill>
-              </a:defRPr>
-            </a:pPr>
-            <a:r>
-              <a:t>• 2. Treating replication as integration -&gt; tight coupling</a:t>
-            </a:r>
-          </a:p>
-        </p:txBody>
-      </p:sp>
-      <p:sp>
-        <p:nvSpPr>
-          <p:cNvPr id="6" name="TextBox 5"/>
-          <p:cNvSpPr txBox="1"/>
-          <p:nvPr/>
-        </p:nvSpPr>
-        <p:spPr>
-          <a:xfrm>
-            <a:off x="914400" y="3931920"/>
-            <a:ext cx="7772400" cy="274320"/>
-          </a:xfrm>
-          <a:prstGeom prst="rect">
-            <a:avLst/>
-          </a:prstGeom>
-          <a:noFill/>
-        </p:spPr>
-        <p:txBody>
-          <a:bodyPr wrap="none">
-            <a:spAutoFit/>
-          </a:bodyPr>
-          <a:lstStyle/>
-          <a:p>
-            <a:pPr>
-              <a:defRPr sz="1400">
-                <a:solidFill>
-                  <a:srgbClr val="E6EDF3"/>
-                </a:solidFill>
-              </a:defRPr>
-            </a:pPr>
-            <a:r>
-              <a:t>• 3. No replay/audit capability -&gt; cannot reconstruct state</a:t>
-            </a:r>
-          </a:p>
-        </p:txBody>
-      </p:sp>
-      <p:sp>
-        <p:nvSpPr>
-          <p:cNvPr id="7" name="TextBox 6"/>
-          <p:cNvSpPr txBox="1"/>
-          <p:nvPr/>
-        </p:nvSpPr>
-        <p:spPr>
-          <a:xfrm>
-            <a:off x="914400" y="4251959"/>
-            <a:ext cx="7772400" cy="274320"/>
-          </a:xfrm>
-          <a:prstGeom prst="rect">
-            <a:avLst/>
-          </a:prstGeom>
-          <a:noFill/>
-        </p:spPr>
-        <p:txBody>
-          <a:bodyPr wrap="none">
-            <a:spAutoFit/>
-          </a:bodyPr>
-          <a:lstStyle/>
-          <a:p>
-            <a:pPr>
-              <a:defRPr sz="1400">
-                <a:solidFill>
-                  <a:srgbClr val="E6EDF3"/>
-                </a:solidFill>
-              </a:defRPr>
-            </a:pPr>
-            <a:r>
-              <a:t>• 4. Expecting exactly-once delivery -&gt; a transport myth</a:t>
-            </a:r>
-          </a:p>
-        </p:txBody>
-      </p:sp>
-      <p:sp>
-        <p:nvSpPr>
-          <p:cNvPr id="8" name="TextBox 7"/>
-          <p:cNvSpPr txBox="1"/>
-          <p:nvPr/>
-        </p:nvSpPr>
-        <p:spPr>
-          <a:xfrm>
-            <a:off x="914400" y="4571999"/>
-            <a:ext cx="7772400" cy="274320"/>
-          </a:xfrm>
-          <a:prstGeom prst="rect">
-            <a:avLst/>
-          </a:prstGeom>
-          <a:noFill/>
-        </p:spPr>
-        <p:txBody>
-          <a:bodyPr wrap="none">
-            <a:spAutoFit/>
-          </a:bodyPr>
-          <a:lstStyle/>
-          <a:p>
-            <a:pPr>
-              <a:defRPr sz="1400">
-                <a:solidFill>
-                  <a:srgbClr val="E6EDF3"/>
-                </a:solidFill>
-              </a:defRPr>
-            </a:pPr>
-            <a:r>
-              <a:t>• 5. Latency coupling assumptions -&gt; downstream is not constant</a:t>
-            </a:r>
-          </a:p>
-        </p:txBody>
-      </p:sp>
-      <p:sp>
-        <p:nvSpPr>
-          <p:cNvPr id="9" name="TextBox 8"/>
-          <p:cNvSpPr txBox="1"/>
-          <p:nvPr/>
-        </p:nvSpPr>
-        <p:spPr>
-          <a:xfrm>
-            <a:off x="8229600" y="4846320"/>
-            <a:ext cx="731520" cy="228600"/>
-          </a:xfrm>
-          <a:prstGeom prst="rect">
-            <a:avLst/>
-          </a:prstGeom>
-          <a:noFill/>
-        </p:spPr>
-        <p:txBody>
-          <a:bodyPr wrap="none">
-            <a:spAutoFit/>
-          </a:bodyPr>
-          <a:lstStyle/>
-          <a:p>
-            <a:pPr algn="r">
-              <a:defRPr sz="800">
-                <a:solidFill>
-                  <a:srgbClr val="E6EDF3"/>
-                </a:solidFill>
-              </a:defRPr>
-            </a:pPr>
-            <a:r>
-              <a:t>14/18</a:t>
-            </a:r>
-          </a:p>
-        </p:txBody>
-      </p:sp>
-    </p:spTree>
-  </p:cSld>
-  <p:clrMapOvr>
-    <a:masterClrMapping/>
-  </p:clrMapOvr>
-</p:sld>
-</file>
-
-<file path=ppt/slides/slide15.xml><?xml version="1.0" encoding="utf-8"?>
-<p:sld xmlns:a="http://schemas.openxmlformats.org/drawingml/2006/main" xmlns:p="http://schemas.openxmlformats.org/presentationml/2006/main" xmlns:r="http://schemas.openxmlformats.org/officeDocument/2006/relationships">
-  <p:cSld>
-    <p:bg>
-      <p:bgPr>
-        <a:solidFill>
-          <a:srgbClr val="0D1117"/>
-        </a:solidFill>
-        <a:effectLst/>
-      </p:bgPr>
-    </p:bg>
-    <p:spTree>
-      <p:nvGrpSpPr>
-        <p:cNvPr id="1" name=""/>
-        <p:cNvGrpSpPr/>
-        <p:nvPr/>
-      </p:nvGrpSpPr>
-      <p:grpSpPr/>
-      <p:sp>
-        <p:nvSpPr>
-          <p:cNvPr id="2" name="TextBox 1"/>
-          <p:cNvSpPr txBox="1"/>
-          <p:nvPr/>
-        </p:nvSpPr>
-        <p:spPr>
-          <a:xfrm>
-            <a:off x="457200" y="365760"/>
-            <a:ext cx="8229600" cy="731520"/>
-          </a:xfrm>
-          <a:prstGeom prst="rect">
-            <a:avLst/>
-          </a:prstGeom>
-          <a:noFill/>
-        </p:spPr>
-        <p:txBody>
-          <a:bodyPr wrap="none">
-            <a:spAutoFit/>
-          </a:bodyPr>
-          <a:lstStyle/>
-          <a:p>
-            <a:pPr>
-              <a:defRPr sz="4000" b="1">
-                <a:solidFill>
-                  <a:srgbClr val="58A6FF"/>
-                </a:solidFill>
-              </a:defRPr>
-            </a:pPr>
-            <a:r>
-              <a:t>The Banking Solution</a:t>
-            </a:r>
-          </a:p>
-        </p:txBody>
-      </p:sp>
-      <p:sp>
-        <p:nvSpPr>
-          <p:cNvPr id="3" name="TextBox 2"/>
-          <p:cNvSpPr txBox="1"/>
-          <p:nvPr/>
-        </p:nvSpPr>
-        <p:spPr>
-          <a:xfrm>
-            <a:off x="457200" y="1280160"/>
-            <a:ext cx="8229600" cy="1828800"/>
-          </a:xfrm>
-          <a:prstGeom prst="rect">
-            <a:avLst/>
-          </a:prstGeom>
-          <a:noFill/>
-        </p:spPr>
-        <p:txBody>
-          <a:bodyPr wrap="square">
-            <a:spAutoFit/>
-          </a:bodyPr>
-          <a:lstStyle/>
-          <a:p>
-            <a:pPr>
-              <a:defRPr sz="1800">
-                <a:solidFill>
-                  <a:srgbClr val="E6EDF3"/>
-                </a:solidFill>
-              </a:defRPr>
-            </a:pPr>
-            <a:r>
-              <a:t>Three principles to avoid the five mistakes:</a:t>
-            </a:r>
-          </a:p>
-        </p:txBody>
-      </p:sp>
-      <p:sp>
-        <p:nvSpPr>
-          <p:cNvPr id="4" name="TextBox 3"/>
-          <p:cNvSpPr txBox="1"/>
-          <p:nvPr/>
-        </p:nvSpPr>
-        <p:spPr>
-          <a:xfrm>
-            <a:off x="914400" y="3291840"/>
-            <a:ext cx="7772400" cy="274320"/>
-          </a:xfrm>
-          <a:prstGeom prst="rect">
-            <a:avLst/>
-          </a:prstGeom>
-          <a:noFill/>
-        </p:spPr>
-        <p:txBody>
-          <a:bodyPr wrap="none">
-            <a:spAutoFit/>
-          </a:bodyPr>
-          <a:lstStyle/>
-          <a:p>
-            <a:pPr>
-              <a:defRPr sz="1400">
-                <a:solidFill>
-                  <a:srgbClr val="E6EDF3"/>
-                </a:solidFill>
-              </a:defRPr>
-            </a:pPr>
-            <a:r>
-              <a:t>• At-least-once delivery (never lose a message)</a:t>
-            </a:r>
-          </a:p>
-        </p:txBody>
-      </p:sp>
-      <p:sp>
-        <p:nvSpPr>
-          <p:cNvPr id="5" name="TextBox 4"/>
-          <p:cNvSpPr txBox="1"/>
-          <p:nvPr/>
-        </p:nvSpPr>
-        <p:spPr>
-          <a:xfrm>
-            <a:off x="914400" y="3611880"/>
-            <a:ext cx="7772400" cy="274320"/>
-          </a:xfrm>
-          <a:prstGeom prst="rect">
-            <a:avLst/>
-          </a:prstGeom>
-          <a:noFill/>
-        </p:spPr>
-        <p:txBody>
-          <a:bodyPr wrap="none">
-            <a:spAutoFit/>
-          </a:bodyPr>
-          <a:lstStyle/>
-          <a:p>
-            <a:pPr>
-              <a:defRPr sz="1400">
-                <a:solidFill>
-                  <a:srgbClr val="E6EDF3"/>
-                </a:solidFill>
-              </a:defRPr>
-            </a:pPr>
-            <a:r>
-              <a:t>• Idempotent consumers (safe to process duplicates)</a:t>
-            </a:r>
-          </a:p>
-        </p:txBody>
-      </p:sp>
-      <p:sp>
-        <p:nvSpPr>
-          <p:cNvPr id="6" name="TextBox 5"/>
-          <p:cNvSpPr txBox="1"/>
-          <p:nvPr/>
-        </p:nvSpPr>
-        <p:spPr>
-          <a:xfrm>
-            <a:off x="914400" y="3931920"/>
-            <a:ext cx="7772400" cy="274320"/>
-          </a:xfrm>
-          <a:prstGeom prst="rect">
-            <a:avLst/>
-          </a:prstGeom>
-          <a:noFill/>
-        </p:spPr>
-        <p:txBody>
-          <a:bodyPr wrap="none">
-            <a:spAutoFit/>
-          </a:bodyPr>
-          <a:lstStyle/>
-          <a:p>
-            <a:pPr>
-              <a:defRPr sz="1400">
-                <a:solidFill>
-                  <a:srgbClr val="E6EDF3"/>
-                </a:solidFill>
-              </a:defRPr>
-            </a:pPr>
-            <a:r>
-              <a:t>• Ordered events (deterministic state reconstruction)</a:t>
-            </a:r>
-          </a:p>
-        </p:txBody>
-      </p:sp>
-      <p:sp>
-        <p:nvSpPr>
-          <p:cNvPr id="7" name="TextBox 6"/>
-          <p:cNvSpPr txBox="1"/>
-          <p:nvPr/>
-        </p:nvSpPr>
-        <p:spPr>
-          <a:xfrm>
-            <a:off x="8229600" y="4846320"/>
-            <a:ext cx="731520" cy="228600"/>
-          </a:xfrm>
-          <a:prstGeom prst="rect">
-            <a:avLst/>
-          </a:prstGeom>
-          <a:noFill/>
-        </p:spPr>
-        <p:txBody>
-          <a:bodyPr wrap="none">
-            <a:spAutoFit/>
-          </a:bodyPr>
-          <a:lstStyle/>
-          <a:p>
-            <a:pPr algn="r">
-              <a:defRPr sz="800">
-                <a:solidFill>
-                  <a:srgbClr val="E6EDF3"/>
-                </a:solidFill>
-              </a:defRPr>
-            </a:pPr>
-            <a:r>
-              <a:t>15/18</a:t>
-            </a:r>
-          </a:p>
-        </p:txBody>
-      </p:sp>
-    </p:spTree>
-  </p:cSld>
-  <p:clrMapOvr>
-    <a:masterClrMapping/>
-  </p:clrMapOvr>
-</p:sld>
-</file>
-
-<file path=ppt/slides/slide16.xml><?xml version="1.0" encoding="utf-8"?>
-<p:sld xmlns:a="http://schemas.openxmlformats.org/drawingml/2006/main" xmlns:p="http://schemas.openxmlformats.org/presentationml/2006/main" xmlns:r="http://schemas.openxmlformats.org/officeDocument/2006/relationships">
-  <p:cSld>
-    <p:bg>
-      <p:bgPr>
-        <a:solidFill>
-          <a:srgbClr val="0D1117"/>
-        </a:solidFill>
-        <a:effectLst/>
-      </p:bgPr>
-    </p:bg>
-    <p:spTree>
-      <p:nvGrpSpPr>
-        <p:cNvPr id="1" name=""/>
-        <p:cNvGrpSpPr/>
-        <p:nvPr/>
-      </p:nvGrpSpPr>
-      <p:grpSpPr/>
-      <p:sp>
-        <p:nvSpPr>
-          <p:cNvPr id="2" name="TextBox 1"/>
-          <p:cNvSpPr txBox="1"/>
-          <p:nvPr/>
-        </p:nvSpPr>
-        <p:spPr>
-          <a:xfrm>
-            <a:off x="457200" y="365760"/>
-            <a:ext cx="2743200" cy="274320"/>
-          </a:xfrm>
-          <a:prstGeom prst="rect">
-            <a:avLst/>
-          </a:prstGeom>
-          <a:noFill/>
-        </p:spPr>
-        <p:txBody>
-          <a:bodyPr wrap="none">
-            <a:spAutoFit/>
-          </a:bodyPr>
-          <a:lstStyle/>
-          <a:p>
-            <a:pPr>
-              <a:defRPr sz="1000">
-                <a:solidFill>
-                  <a:srgbClr val="79C0FF"/>
-                </a:solidFill>
-              </a:defRPr>
-            </a:pPr>
-            <a:r>
-              <a:t>Code: TEXT</a:t>
-            </a:r>
-          </a:p>
-        </p:txBody>
-      </p:sp>
-      <p:sp>
-        <p:nvSpPr>
-          <p:cNvPr id="3" name="Rectangle 2"/>
-          <p:cNvSpPr/>
-          <p:nvPr/>
-        </p:nvSpPr>
-        <p:spPr>
-          <a:xfrm>
-            <a:off x="457200" y="914400"/>
-            <a:ext cx="8229600" cy="3657600"/>
-          </a:xfrm>
-          <a:prstGeom prst="rect">
-            <a:avLst/>
-          </a:prstGeom>
-          <a:solidFill>
-            <a:srgbClr val="0D1117"/>
-          </a:solidFill>
-          <a:ln>
-            <a:solidFill>
-              <a:srgbClr val="79C0FF"/>
-            </a:solidFill>
-          </a:ln>
-        </p:spPr>
-        <p:style>
-          <a:lnRef idx="1">
-            <a:schemeClr val="accent1"/>
-          </a:lnRef>
-          <a:fillRef idx="3">
-            <a:schemeClr val="accent1"/>
-          </a:fillRef>
-          <a:effectRef idx="2">
-            <a:schemeClr val="accent1"/>
-          </a:effectRef>
-          <a:fontRef idx="minor">
-            <a:schemeClr val="lt1"/>
-          </a:fontRef>
-        </p:style>
-        <p:txBody>
-          <a:bodyPr rtlCol="0" anchor="ctr"/>
-          <a:lstStyle/>
-          <a:p>
-            <a:pPr algn="ctr"/>
-          </a:p>
-        </p:txBody>
-      </p:sp>
-      <p:sp>
-        <p:nvSpPr>
-          <p:cNvPr id="4" name="TextBox 3"/>
-          <p:cNvSpPr txBox="1"/>
-          <p:nvPr/>
-        </p:nvSpPr>
-        <p:spPr>
-          <a:xfrm>
-            <a:off x="640080" y="1097280"/>
-            <a:ext cx="7863840" cy="3291840"/>
-          </a:xfrm>
-          <a:prstGeom prst="rect">
-            <a:avLst/>
-          </a:prstGeom>
-          <a:noFill/>
-        </p:spPr>
-        <p:txBody>
-          <a:bodyPr wrap="square" anchor="t">
-            <a:spAutoFit/>
-          </a:bodyPr>
-          <a:lstStyle/>
-          <a:p>
-            <a:pPr>
-              <a:defRPr sz="1000">
-                <a:solidFill>
-                  <a:srgbClr val="E6EDF3"/>
-                </a:solidFill>
-                <a:latin typeface="Monaco"/>
-              </a:defRPr>
-            </a:pPr>
-            <a:r>
-              <a:t>    Golden Triangle of Banking Architecture</a:t>
-            </a:r>
-            <a:br/>
-            <a:br/>
-            <a:r>
-              <a:t>    +---------------------------+</a:t>
-            </a:r>
-            <a:br/>
-            <a:r>
-              <a:t>    |  Experience Layer (APIs)   |  &lt;- Agility</a:t>
-            </a:r>
-            <a:br/>
-            <a:r>
-              <a:t>    +-------------+-------------+</a:t>
-            </a:r>
-            <a:br/>
-            <a:r>
-              <a:t>                  |</a:t>
-            </a:r>
-            <a:br/>
-            <a:r>
-              <a:t>    +-------------v-------------+</a:t>
-            </a:r>
-            <a:br/>
-            <a:r>
-              <a:t>    | Integration Backbone       |  &lt;- Decoupling</a:t>
-            </a:r>
-            <a:br/>
-            <a:r>
-              <a:t>    |       (Kafka)              |</a:t>
-            </a:r>
-            <a:br/>
-            <a:r>
-              <a:t>    +-------------+-------------+</a:t>
-            </a:r>
-            <a:br/>
-            <a:r>
-              <a:t>                  |</a:t>
-            </a:r>
-            <a:br/>
-            <a:r>
-              <a:t>    +-------------v-------------+</a:t>
-            </a:r>
-            <a:br/>
-            <a:r>
-              <a:t>    |  System of Record          |  &lt;- Correctness</a:t>
-            </a:r>
-            <a:br/>
-            <a:r>
-              <a:t>    |      (Oracle)              |</a:t>
-            </a:r>
-            <a:br/>
-            <a:r>
-              <a:t>    +---------------------------+</a:t>
-            </a:r>
-            <a:br/>
-            <a:br/>
-            <a:r>
-              <a:t>Oracle -&gt; correctness &amp; transactional integrity</a:t>
-            </a:r>
-            <a:br/>
-            <a:r>
-              <a:t>Kafka  -&gt; decoupling &amp; event distribution</a:t>
-            </a:r>
-            <a:br/>
-            <a:r>
-              <a:t>APIs   -&gt; agility &amp; consumer experience</a:t>
-            </a:r>
-          </a:p>
-        </p:txBody>
-      </p:sp>
-      <p:sp>
-        <p:nvSpPr>
-          <p:cNvPr id="5" name="TextBox 4"/>
-          <p:cNvSpPr txBox="1"/>
-          <p:nvPr/>
-        </p:nvSpPr>
-        <p:spPr>
-          <a:xfrm>
-            <a:off x="8229600" y="4846320"/>
-            <a:ext cx="731520" cy="228600"/>
-          </a:xfrm>
-          <a:prstGeom prst="rect">
-            <a:avLst/>
-          </a:prstGeom>
-          <a:noFill/>
-        </p:spPr>
-        <p:txBody>
-          <a:bodyPr wrap="none">
-            <a:spAutoFit/>
-          </a:bodyPr>
-          <a:lstStyle/>
-          <a:p>
-            <a:pPr algn="r">
-              <a:defRPr sz="800">
-                <a:solidFill>
-                  <a:srgbClr val="E6EDF3"/>
-                </a:solidFill>
-              </a:defRPr>
-            </a:pPr>
-            <a:r>
-              <a:t>16/18</a:t>
-            </a:r>
-          </a:p>
-        </p:txBody>
-      </p:sp>
-    </p:spTree>
-  </p:cSld>
-  <p:clrMapOvr>
-    <a:masterClrMapping/>
-  </p:clrMapOvr>
-</p:sld>
-</file>
-
-<file path=ppt/slides/slide17.xml><?xml version="1.0" encoding="utf-8"?>
-<p:sld xmlns:a="http://schemas.openxmlformats.org/drawingml/2006/main" xmlns:p="http://schemas.openxmlformats.org/presentationml/2006/main" xmlns:r="http://schemas.openxmlformats.org/officeDocument/2006/relationships">
-  <p:cSld>
-    <p:bg>
-      <p:bgPr>
-        <a:solidFill>
-          <a:srgbClr val="0D1117"/>
-        </a:solidFill>
-        <a:effectLst/>
-      </p:bgPr>
-    </p:bg>
-    <p:spTree>
-      <p:nvGrpSpPr>
-        <p:cNvPr id="1" name=""/>
-        <p:cNvGrpSpPr/>
-        <p:nvPr/>
-      </p:nvGrpSpPr>
-      <p:grpSpPr/>
-      <p:sp>
-        <p:nvSpPr>
-          <p:cNvPr id="2" name="TextBox 1"/>
-          <p:cNvSpPr txBox="1"/>
-          <p:nvPr/>
-        </p:nvSpPr>
-        <p:spPr>
-          <a:xfrm>
-            <a:off x="457200" y="365760"/>
-            <a:ext cx="8229600" cy="731520"/>
-          </a:xfrm>
-          <a:prstGeom prst="rect">
-            <a:avLst/>
-          </a:prstGeom>
-          <a:noFill/>
-        </p:spPr>
-        <p:txBody>
-          <a:bodyPr wrap="none">
-            <a:spAutoFit/>
-          </a:bodyPr>
-          <a:lstStyle/>
-          <a:p>
-            <a:pPr>
-              <a:defRPr sz="4000" b="1">
-                <a:solidFill>
-                  <a:srgbClr val="58A6FF"/>
-                </a:solidFill>
-              </a:defRPr>
-            </a:pPr>
-            <a:r>
-              <a:t>10. Final Architectural Position</a:t>
-            </a:r>
-          </a:p>
-        </p:txBody>
-      </p:sp>
-      <p:sp>
-        <p:nvSpPr>
-          <p:cNvPr id="3" name="TextBox 2"/>
-          <p:cNvSpPr txBox="1"/>
-          <p:nvPr/>
-        </p:nvSpPr>
-        <p:spPr>
-          <a:xfrm>
-            <a:off x="457200" y="1280160"/>
-            <a:ext cx="8229600" cy="1828800"/>
-          </a:xfrm>
-          <a:prstGeom prst="rect">
-            <a:avLst/>
-          </a:prstGeom>
-          <a:noFill/>
-        </p:spPr>
-        <p:txBody>
-          <a:bodyPr wrap="square">
-            <a:spAutoFit/>
-          </a:bodyPr>
-          <a:lstStyle/>
-          <a:p>
-            <a:pPr>
-              <a:defRPr sz="1800">
-                <a:solidFill>
-                  <a:srgbClr val="E6EDF3"/>
-                </a:solidFill>
-              </a:defRPr>
-            </a:pPr>
-            <a:r>
-              <a:t>Architecture aligns with modern Tier-1 banking patterns:</a:t>
-            </a:r>
-          </a:p>
-        </p:txBody>
-      </p:sp>
-      <p:sp>
-        <p:nvSpPr>
-          <p:cNvPr id="4" name="TextBox 3"/>
-          <p:cNvSpPr txBox="1"/>
-          <p:nvPr/>
-        </p:nvSpPr>
-        <p:spPr>
-          <a:xfrm>
-            <a:off x="914400" y="3291840"/>
-            <a:ext cx="7772400" cy="274320"/>
-          </a:xfrm>
-          <a:prstGeom prst="rect">
-            <a:avLst/>
-          </a:prstGeom>
-          <a:noFill/>
-        </p:spPr>
-        <p:txBody>
-          <a:bodyPr wrap="none">
-            <a:spAutoFit/>
-          </a:bodyPr>
-          <a:lstStyle/>
-          <a:p>
-            <a:pPr>
-              <a:defRPr sz="1400">
-                <a:solidFill>
-                  <a:srgbClr val="E6EDF3"/>
-                </a:solidFill>
-              </a:defRPr>
-            </a:pPr>
-            <a:r>
-              <a:t>• Oracle as system of record with one-direction data flow</a:t>
-            </a:r>
-          </a:p>
-        </p:txBody>
-      </p:sp>
-      <p:sp>
-        <p:nvSpPr>
-          <p:cNvPr id="5" name="TextBox 4"/>
-          <p:cNvSpPr txBox="1"/>
-          <p:nvPr/>
-        </p:nvSpPr>
-        <p:spPr>
-          <a:xfrm>
-            <a:off x="914400" y="3611880"/>
-            <a:ext cx="7772400" cy="274320"/>
-          </a:xfrm>
-          <a:prstGeom prst="rect">
-            <a:avLst/>
-          </a:prstGeom>
-          <a:noFill/>
-        </p:spPr>
-        <p:txBody>
-          <a:bodyPr wrap="none">
-            <a:spAutoFit/>
-          </a:bodyPr>
-          <a:lstStyle/>
-          <a:p>
-            <a:pPr>
-              <a:defRPr sz="1400">
-                <a:solidFill>
-                  <a:srgbClr val="E6EDF3"/>
-                </a:solidFill>
-              </a:defRPr>
-            </a:pPr>
-            <a:r>
-              <a:t>• CDC replication feeding an event backbone</a:t>
-            </a:r>
-          </a:p>
-        </p:txBody>
-      </p:sp>
-      <p:sp>
-        <p:nvSpPr>
-          <p:cNvPr id="6" name="TextBox 5"/>
-          <p:cNvSpPr txBox="1"/>
-          <p:nvPr/>
-        </p:nvSpPr>
-        <p:spPr>
-          <a:xfrm>
-            <a:off x="914400" y="3931920"/>
-            <a:ext cx="7772400" cy="274320"/>
-          </a:xfrm>
-          <a:prstGeom prst="rect">
-            <a:avLst/>
-          </a:prstGeom>
-          <a:noFill/>
-        </p:spPr>
-        <p:txBody>
-          <a:bodyPr wrap="none">
-            <a:spAutoFit/>
-          </a:bodyPr>
-          <a:lstStyle/>
-          <a:p>
-            <a:pPr>
-              <a:defRPr sz="1400">
-                <a:solidFill>
-                  <a:srgbClr val="E6EDF3"/>
-                </a:solidFill>
-              </a:defRPr>
-            </a:pPr>
-            <a:r>
-              <a:t>• Idempotent processing with schema governance</a:t>
-            </a:r>
-          </a:p>
-        </p:txBody>
-      </p:sp>
-      <p:sp>
-        <p:nvSpPr>
-          <p:cNvPr id="7" name="TextBox 6"/>
-          <p:cNvSpPr txBox="1"/>
-          <p:nvPr/>
-        </p:nvSpPr>
-        <p:spPr>
-          <a:xfrm>
-            <a:off x="914400" y="4251959"/>
-            <a:ext cx="7772400" cy="274320"/>
-          </a:xfrm>
-          <a:prstGeom prst="rect">
-            <a:avLst/>
-          </a:prstGeom>
-          <a:noFill/>
-        </p:spPr>
-        <p:txBody>
-          <a:bodyPr wrap="none">
-            <a:spAutoFit/>
-          </a:bodyPr>
-          <a:lstStyle/>
-          <a:p>
-            <a:pPr>
-              <a:defRPr sz="1400">
-                <a:solidFill>
-                  <a:srgbClr val="E6EDF3"/>
-                </a:solidFill>
-              </a:defRPr>
-            </a:pPr>
-            <a:r>
-              <a:t>• Corresponds to Banking Maturity Level 2-3</a:t>
-            </a:r>
-          </a:p>
-        </p:txBody>
-      </p:sp>
-      <p:sp>
-        <p:nvSpPr>
-          <p:cNvPr id="8" name="TextBox 7"/>
-          <p:cNvSpPr txBox="1"/>
-          <p:nvPr/>
-        </p:nvSpPr>
-        <p:spPr>
-          <a:xfrm>
-            <a:off x="8229600" y="4846320"/>
-            <a:ext cx="731520" cy="228600"/>
-          </a:xfrm>
-          <a:prstGeom prst="rect">
-            <a:avLst/>
-          </a:prstGeom>
-          <a:noFill/>
-        </p:spPr>
-        <p:txBody>
-          <a:bodyPr wrap="none">
-            <a:spAutoFit/>
-          </a:bodyPr>
-          <a:lstStyle/>
-          <a:p>
-            <a:pPr algn="r">
-              <a:defRPr sz="800">
-                <a:solidFill>
-                  <a:srgbClr val="E6EDF3"/>
-                </a:solidFill>
-              </a:defRPr>
-            </a:pPr>
-            <a:r>
-              <a:t>17/18</a:t>
-            </a:r>
-          </a:p>
-        </p:txBody>
-      </p:sp>
-    </p:spTree>
-  </p:cSld>
-  <p:clrMapOvr>
-    <a:masterClrMapping/>
-  </p:clrMapOvr>
-</p:sld>
-</file>
-
-<file path=ppt/slides/slide18.xml><?xml version="1.0" encoding="utf-8"?>
-<p:sld xmlns:a="http://schemas.openxmlformats.org/drawingml/2006/main" xmlns:p="http://schemas.openxmlformats.org/presentationml/2006/main" xmlns:r="http://schemas.openxmlformats.org/officeDocument/2006/relationships">
-  <p:cSld>
-    <p:bg>
-      <p:bgPr>
-        <a:solidFill>
-          <a:srgbClr val="0D1117"/>
-        </a:solidFill>
-        <a:effectLst/>
-      </p:bgPr>
-    </p:bg>
-    <p:spTree>
-      <p:nvGrpSpPr>
-        <p:cNvPr id="1" name=""/>
-        <p:cNvGrpSpPr/>
-        <p:nvPr/>
-      </p:nvGrpSpPr>
-      <p:grpSpPr/>
-      <p:sp>
-        <p:nvSpPr>
-          <p:cNvPr id="2" name="TextBox 1"/>
-          <p:cNvSpPr txBox="1"/>
-          <p:nvPr/>
-        </p:nvSpPr>
-        <p:spPr>
-          <a:xfrm>
-            <a:off x="457200" y="365760"/>
-            <a:ext cx="8229600" cy="548640"/>
-          </a:xfrm>
-          <a:prstGeom prst="rect">
-            <a:avLst/>
-          </a:prstGeom>
-          <a:noFill/>
-        </p:spPr>
-        <p:txBody>
-          <a:bodyPr wrap="none">
-            <a:spAutoFit/>
-          </a:bodyPr>
-          <a:lstStyle/>
-          <a:p>
-            <a:pPr>
-              <a:defRPr sz="4000" b="1">
-                <a:solidFill>
-                  <a:srgbClr val="58A6FF"/>
-                </a:solidFill>
-              </a:defRPr>
-            </a:pPr>
-            <a:r>
-              <a:t>Key Takeaways</a:t>
-            </a:r>
-          </a:p>
-        </p:txBody>
-      </p:sp>
-      <p:sp>
-        <p:nvSpPr>
-          <p:cNvPr id="3" name="TextBox 2"/>
-          <p:cNvSpPr txBox="1"/>
-          <p:nvPr/>
-        </p:nvSpPr>
-        <p:spPr>
-          <a:xfrm>
-            <a:off x="914400" y="1188720"/>
-            <a:ext cx="7772400" cy="457200"/>
-          </a:xfrm>
-          <a:prstGeom prst="rect">
-            <a:avLst/>
-          </a:prstGeom>
-          <a:noFill/>
-        </p:spPr>
-        <p:txBody>
-          <a:bodyPr wrap="square">
-            <a:spAutoFit/>
-          </a:bodyPr>
-          <a:lstStyle/>
-          <a:p>
-            <a:pPr>
-              <a:defRPr sz="1600">
-                <a:solidFill>
-                  <a:srgbClr val="E6EDF3"/>
-                </a:solidFill>
-              </a:defRPr>
-            </a:pPr>
-            <a:r>
-              <a:t>✓ Kafka + Avro is the most efficient wire protocol (18.5% overhead)</a:t>
-            </a:r>
-          </a:p>
-        </p:txBody>
-      </p:sp>
-      <p:sp>
-        <p:nvSpPr>
-          <p:cNvPr id="4" name="TextBox 3"/>
-          <p:cNvSpPr txBox="1"/>
-          <p:nvPr/>
-        </p:nvSpPr>
-        <p:spPr>
-          <a:xfrm>
-            <a:off x="914400" y="1783080"/>
-            <a:ext cx="7772400" cy="457200"/>
-          </a:xfrm>
-          <a:prstGeom prst="rect">
-            <a:avLst/>
-          </a:prstGeom>
-          <a:noFill/>
-        </p:spPr>
-        <p:txBody>
-          <a:bodyPr wrap="square">
-            <a:spAutoFit/>
-          </a:bodyPr>
-          <a:lstStyle/>
-          <a:p>
-            <a:pPr>
-              <a:defRPr sz="1600">
-                <a:solidFill>
-                  <a:srgbClr val="E6EDF3"/>
-                </a:solidFill>
-              </a:defRPr>
-            </a:pPr>
-            <a:r>
-              <a:t>✓ CDC + Event Backbone is the standard banking integration pattern</a:t>
-            </a:r>
-          </a:p>
-        </p:txBody>
-      </p:sp>
-      <p:sp>
-        <p:nvSpPr>
-          <p:cNvPr id="5" name="TextBox 4"/>
-          <p:cNvSpPr txBox="1"/>
-          <p:nvPr/>
-        </p:nvSpPr>
-        <p:spPr>
-          <a:xfrm>
-            <a:off x="914400" y="2377440"/>
-            <a:ext cx="7772400" cy="457200"/>
-          </a:xfrm>
-          <a:prstGeom prst="rect">
-            <a:avLst/>
-          </a:prstGeom>
-          <a:noFill/>
-        </p:spPr>
-        <p:txBody>
-          <a:bodyPr wrap="square">
-            <a:spAutoFit/>
-          </a:bodyPr>
-          <a:lstStyle/>
-          <a:p>
-            <a:pPr>
-              <a:defRPr sz="1600">
-                <a:solidFill>
-                  <a:srgbClr val="E6EDF3"/>
-                </a:solidFill>
-              </a:defRPr>
-            </a:pPr>
-            <a:r>
-              <a:t>✓ Design for idempotency, ordering, and replay</a:t>
-            </a:r>
-          </a:p>
-        </p:txBody>
-      </p:sp>
-      <p:sp>
-        <p:nvSpPr>
-          <p:cNvPr id="6" name="TextBox 5"/>
-          <p:cNvSpPr txBox="1"/>
-          <p:nvPr/>
-        </p:nvSpPr>
-        <p:spPr>
-          <a:xfrm>
-            <a:off x="914400" y="2971800"/>
-            <a:ext cx="7772400" cy="457200"/>
-          </a:xfrm>
-          <a:prstGeom prst="rect">
-            <a:avLst/>
-          </a:prstGeom>
-          <a:noFill/>
-        </p:spPr>
-        <p:txBody>
-          <a:bodyPr wrap="square">
-            <a:spAutoFit/>
-          </a:bodyPr>
-          <a:lstStyle/>
-          <a:p>
-            <a:pPr>
-              <a:defRPr sz="1600">
-                <a:solidFill>
-                  <a:srgbClr val="E6EDF3"/>
-                </a:solidFill>
-              </a:defRPr>
-            </a:pPr>
-            <a:r>
-              <a:t>✓ Avoid dual writes and exactly-once assumptions</a:t>
-            </a:r>
-          </a:p>
-        </p:txBody>
-      </p:sp>
-      <p:sp>
-        <p:nvSpPr>
-          <p:cNvPr id="7" name="TextBox 6"/>
-          <p:cNvSpPr txBox="1"/>
-          <p:nvPr/>
-        </p:nvSpPr>
-        <p:spPr>
-          <a:xfrm>
-            <a:off x="914400" y="3566160"/>
-            <a:ext cx="7772400" cy="457200"/>
-          </a:xfrm>
-          <a:prstGeom prst="rect">
-            <a:avLst/>
-          </a:prstGeom>
-          <a:noFill/>
-        </p:spPr>
-        <p:txBody>
-          <a:bodyPr wrap="square">
-            <a:spAutoFit/>
-          </a:bodyPr>
-          <a:lstStyle/>
-          <a:p>
-            <a:pPr>
-              <a:defRPr sz="1600">
-                <a:solidFill>
-                  <a:srgbClr val="E6EDF3"/>
-                </a:solidFill>
-              </a:defRPr>
-            </a:pPr>
-            <a:r>
-              <a:t>✓ Target Maturity Level 2-3 for modern banking</a:t>
-            </a:r>
-          </a:p>
-        </p:txBody>
-      </p:sp>
-      <p:sp>
-        <p:nvSpPr>
-          <p:cNvPr id="8" name="TextBox 7"/>
-          <p:cNvSpPr txBox="1"/>
-          <p:nvPr/>
-        </p:nvSpPr>
-        <p:spPr>
-          <a:xfrm>
-            <a:off x="457200" y="4114800"/>
-            <a:ext cx="8229600" cy="731520"/>
-          </a:xfrm>
-          <a:prstGeom prst="rect">
-            <a:avLst/>
-          </a:prstGeom>
-          <a:noFill/>
-        </p:spPr>
-        <p:txBody>
-          <a:bodyPr wrap="square">
-            <a:spAutoFit/>
-          </a:bodyPr>
-          <a:lstStyle/>
-          <a:p>
-            <a:pPr algn="ctr">
-              <a:defRPr sz="1400">
-                <a:solidFill>
-                  <a:srgbClr val="79C0FF"/>
-                </a:solidFill>
-              </a:defRPr>
-            </a:pPr>
-            <a:r>
-              <a:t>Wallace Espindola | github.com/wallaceespindola | linkedin.com/in/wallaceespindola</a:t>
-            </a:r>
-          </a:p>
-        </p:txBody>
-      </p:sp>
-      <p:sp>
-        <p:nvSpPr>
-          <p:cNvPr id="9" name="TextBox 8"/>
-          <p:cNvSpPr txBox="1"/>
-          <p:nvPr/>
-        </p:nvSpPr>
-        <p:spPr>
-          <a:xfrm>
-            <a:off x="8229600" y="4846320"/>
-            <a:ext cx="731520" cy="228600"/>
-          </a:xfrm>
-          <a:prstGeom prst="rect">
-            <a:avLst/>
-          </a:prstGeom>
-          <a:noFill/>
-        </p:spPr>
-        <p:txBody>
-          <a:bodyPr wrap="none">
-            <a:spAutoFit/>
-          </a:bodyPr>
-          <a:lstStyle/>
-          <a:p>
-            <a:pPr algn="r">
-              <a:defRPr sz="800">
-                <a:solidFill>
-                  <a:srgbClr val="E6EDF3"/>
-                </a:solidFill>
-              </a:defRPr>
-            </a:pPr>
-            <a:r>
-              <a:t>18/18</a:t>
+              <a:t>11/11</a:t>
             </a:r>
           </a:p>
         </p:txBody>
@@ -5857,7 +3978,7 @@
               </a:defRPr>
             </a:pPr>
             <a:r>
-              <a:t>• Integration Scenario &amp; Payload Sizing</a:t>
+              <a:t>• Project overview and tech stack</a:t>
             </a:r>
           </a:p>
         </p:txBody>
@@ -5892,7 +4013,7 @@
               </a:defRPr>
             </a:pPr>
             <a:r>
-              <a:t>• Throughput Analysis (5 Streams)</a:t>
+              <a:t>• Six Resilience4J modules covered</a:t>
             </a:r>
           </a:p>
         </p:txBody>
@@ -5927,7 +4048,7 @@
               </a:defRPr>
             </a:pPr>
             <a:r>
-              <a:t>• Integration Options (Streaming, API, DB)</a:t>
+              <a:t>• CircuitBreaker — trip and recover</a:t>
             </a:r>
           </a:p>
         </p:txBody>
@@ -5962,7 +4083,7 @@
               </a:defRPr>
             </a:pPr>
             <a:r>
-              <a:t>• Oracle-to-Oracle Architecture &amp; Latency Model</a:t>
+              <a:t>• Retry, RateLimiter, Bulkhead</a:t>
             </a:r>
           </a:p>
         </p:txBody>
@@ -5997,7 +4118,7 @@
               </a:defRPr>
             </a:pPr>
             <a:r>
-              <a:t>• Banking Maturity Model &amp; Golden Triangle</a:t>
+              <a:t>• TimeLimiter and Cache</a:t>
             </a:r>
           </a:p>
         </p:txBody>
@@ -6032,7 +4153,7 @@
               </a:defRPr>
             </a:pPr>
             <a:r>
-              <a:t>2/18</a:t>
+              <a:t>2/11</a:t>
             </a:r>
           </a:p>
         </p:txBody>
@@ -6093,7 +4214,7 @@
               </a:defRPr>
             </a:pPr>
             <a:r>
-              <a:t>1. Integration Scenario</a:t>
+              <a:t>Tech Stack</a:t>
             </a:r>
           </a:p>
         </p:txBody>
@@ -6128,7 +4249,7 @@
               </a:defRPr>
             </a:pPr>
             <a:r>
-              <a:t>5 topics/streams with the following message profile:</a:t>
+              <a:t>Built on the latest stable releases:</a:t>
             </a:r>
           </a:p>
         </p:txBody>
@@ -6163,7 +4284,7 @@
               </a:defRPr>
             </a:pPr>
             <a:r>
-              <a:t>• 100 fields per message, 10 characters per field</a:t>
+              <a:t>• Java 21 (LTS)</a:t>
             </a:r>
           </a:p>
         </p:txBody>
@@ -6198,7 +4319,7 @@
               </a:defRPr>
             </a:pPr>
             <a:r>
-              <a:t>• Raw payload: 100 x 10 = 1,000 bytes (1 KB)</a:t>
+              <a:t>• Spring Boot 3.5.3</a:t>
             </a:r>
           </a:p>
         </p:txBody>
@@ -6233,7 +4354,7 @@
               </a:defRPr>
             </a:pPr>
             <a:r>
-              <a:t>• Traffic rates: 100 / 1K / 10K / 100K msgs/min/stream</a:t>
+              <a:t>• Resilience4J 2.3.0</a:t>
             </a:r>
           </a:p>
         </p:txBody>
@@ -6268,7 +4389,7 @@
               </a:defRPr>
             </a:pPr>
             <a:r>
-              <a:t>• Total across 5 streams: 500 to 500,000 msgs/min</a:t>
+              <a:t>• Spring Data JPA + H2 (in-memory)</a:t>
             </a:r>
           </a:p>
         </p:txBody>
@@ -6276,6 +4397,41 @@
       <p:sp>
         <p:nvSpPr>
           <p:cNvPr id="8" name="TextBox 7"/>
+          <p:cNvSpPr txBox="1"/>
+          <p:nvPr/>
+        </p:nvSpPr>
+        <p:spPr>
+          <a:xfrm>
+            <a:off x="914400" y="4571999"/>
+            <a:ext cx="7772400" cy="274320"/>
+          </a:xfrm>
+          <a:prstGeom prst="rect">
+            <a:avLst/>
+          </a:prstGeom>
+          <a:noFill/>
+        </p:spPr>
+        <p:txBody>
+          <a:bodyPr wrap="none">
+            <a:spAutoFit/>
+          </a:bodyPr>
+          <a:lstStyle/>
+          <a:p>
+            <a:pPr>
+              <a:defRPr sz="1400">
+                <a:solidFill>
+                  <a:srgbClr val="E6EDF3"/>
+                </a:solidFill>
+              </a:defRPr>
+            </a:pPr>
+            <a:r>
+              <a:t>• Caffeine JCache (R4J Cache backing store)</a:t>
+            </a:r>
+          </a:p>
+        </p:txBody>
+      </p:sp>
+      <p:sp>
+        <p:nvSpPr>
+          <p:cNvPr id="9" name="TextBox 8"/>
           <p:cNvSpPr txBox="1"/>
           <p:nvPr/>
         </p:nvSpPr>
@@ -6303,7 +4459,7 @@
               </a:defRPr>
             </a:pPr>
             <a:r>
-              <a:t>3/18</a:t>
+              <a:t>3/11</a:t>
             </a:r>
           </a:p>
         </p:txBody>
@@ -6364,7 +4520,7 @@
               </a:defRPr>
             </a:pPr>
             <a:r>
-              <a:t>Message Size by Protocol</a:t>
+              <a:t>Six Fault-Tolerance Modules</a:t>
             </a:r>
           </a:p>
         </p:txBody>
@@ -6399,7 +4555,7 @@
               </a:defRPr>
             </a:pPr>
             <a:r>
-              <a:t>Each protocol adds overhead on top of the raw 1 KB payload:</a:t>
+              <a:t>One demo project, all six R4J patterns:</a:t>
             </a:r>
           </a:p>
         </p:txBody>
@@ -6434,7 +4590,7 @@
               </a:defRPr>
             </a:pPr>
             <a:r>
-              <a:t>• Kafka + Avro: 1,185 B (18.5% overhead) - most efficient</a:t>
+              <a:t>• CircuitBreaker — stop calling a failing downstream</a:t>
             </a:r>
           </a:p>
         </p:txBody>
@@ -6469,7 +4625,7 @@
               </a:defRPr>
             </a:pPr>
             <a:r>
-              <a:t>• Pulsar + Avro: 1,250 B (25.0% overhead)</a:t>
+              <a:t>• Retry — re-attempt transient failures automatically</a:t>
             </a:r>
           </a:p>
         </p:txBody>
@@ -6504,7 +4660,7 @@
               </a:defRPr>
             </a:pPr>
             <a:r>
-              <a:t>• gRPC + Protobuf: 1,300 B (30.0% overhead)</a:t>
+              <a:t>• RateLimiter — cap calls at 5 per second</a:t>
             </a:r>
           </a:p>
         </p:txBody>
@@ -6539,7 +4695,7 @@
               </a:defRPr>
             </a:pPr>
             <a:r>
-              <a:t>• REST + Protobuf: 1,900 B (90.0% overhead) - least efficient</a:t>
+              <a:t>• Bulkhead — limit concurrency to 5 parallel calls</a:t>
             </a:r>
           </a:p>
         </p:txBody>
@@ -6547,6 +4703,41 @@
       <p:sp>
         <p:nvSpPr>
           <p:cNvPr id="8" name="TextBox 7"/>
+          <p:cNvSpPr txBox="1"/>
+          <p:nvPr/>
+        </p:nvSpPr>
+        <p:spPr>
+          <a:xfrm>
+            <a:off x="914400" y="4571999"/>
+            <a:ext cx="7772400" cy="274320"/>
+          </a:xfrm>
+          <a:prstGeom prst="rect">
+            <a:avLst/>
+          </a:prstGeom>
+          <a:noFill/>
+        </p:spPr>
+        <p:txBody>
+          <a:bodyPr wrap="none">
+            <a:spAutoFit/>
+          </a:bodyPr>
+          <a:lstStyle/>
+          <a:p>
+            <a:pPr>
+              <a:defRPr sz="1400">
+                <a:solidFill>
+                  <a:srgbClr val="E6EDF3"/>
+                </a:solidFill>
+              </a:defRPr>
+            </a:pPr>
+            <a:r>
+              <a:t>• TimeLimiter — timeout async calls at 1.5 s</a:t>
+            </a:r>
+          </a:p>
+        </p:txBody>
+      </p:sp>
+      <p:sp>
+        <p:nvSpPr>
+          <p:cNvPr id="9" name="TextBox 8"/>
           <p:cNvSpPr txBox="1"/>
           <p:nvPr/>
         </p:nvSpPr>
@@ -6574,7 +4765,7 @@
               </a:defRPr>
             </a:pPr>
             <a:r>
-              <a:t>4/18</a:t>
+              <a:t>4/11</a:t>
             </a:r>
           </a:p>
         </p:txBody>
@@ -6635,7 +4826,7 @@
               </a:defRPr>
             </a:pPr>
             <a:r>
-              <a:t>Protocol Overhead Breakdown</a:t>
+              <a:t>CircuitBreaker</a:t>
             </a:r>
           </a:p>
         </p:txBody>
@@ -6670,7 +4861,7 @@
               </a:defRPr>
             </a:pPr>
             <a:r>
-              <a:t>Where do the extra bytes come from?</a:t>
+              <a:t>Configured with sliding window of 10 calls:</a:t>
             </a:r>
           </a:p>
         </p:txBody>
@@ -6705,7 +4896,7 @@
               </a:defRPr>
             </a:pPr>
             <a:r>
-              <a:t>• Avro binary encoding: ~100 B (field lengths + schema fingerprint)</a:t>
+              <a:t>• failureRateThreshold = 50%</a:t>
             </a:r>
           </a:p>
         </p:txBody>
@@ -6740,7 +4931,7 @@
               </a:defRPr>
             </a:pPr>
             <a:r>
-              <a:t>• Kafka record framing: ~85 B (timestamp, key, headers, CRC)</a:t>
+              <a:t>• slidingWindowSize = 10 calls</a:t>
             </a:r>
           </a:p>
         </p:txBody>
@@ -6775,7 +4966,7 @@
               </a:defRPr>
             </a:pPr>
             <a:r>
-              <a:t>• Pulsar metadata: ~150 B (publish time, sequence ID, properties)</a:t>
+              <a:t>• waitDurationInOpenState = 10 s</a:t>
             </a:r>
           </a:p>
         </p:txBody>
@@ -6810,7 +5001,7 @@
               </a:defRPr>
             </a:pPr>
             <a:r>
-              <a:t>• Protobuf encoding: ~200-300 B (field tags + length delimiters)</a:t>
+              <a:t>• States: CLOSED -&gt; OPEN -&gt; HALF_OPEN -&gt; CLOSED</a:t>
             </a:r>
           </a:p>
         </p:txBody>
@@ -6845,7 +5036,7 @@
               </a:defRPr>
             </a:pPr>
             <a:r>
-              <a:t>• REST/HTTP headers: ~600-700 B (Content-Type, Host, etc.)</a:t>
+              <a:t>• Forced-open and reset endpoints for demo control</a:t>
             </a:r>
           </a:p>
         </p:txBody>
@@ -6880,7 +5071,7 @@
               </a:defRPr>
             </a:pPr>
             <a:r>
-              <a:t>5/18</a:t>
+              <a:t>5/11</a:t>
             </a:r>
           </a:p>
         </p:txBody>
@@ -6941,7 +5132,7 @@
               </a:defRPr>
             </a:pPr>
             <a:r>
-              <a:t>2. Throughput Analysis (5 Streams)</a:t>
+              <a:t>Retry</a:t>
             </a:r>
           </a:p>
         </p:txBody>
@@ -6976,7 +5167,7 @@
               </a:defRPr>
             </a:pPr>
             <a:r>
-              <a:t>Formula: MB/min = total_msgs x msg_size / 1,000,000</a:t>
+              <a:t>Handles transient errors with exponential backoff:</a:t>
             </a:r>
           </a:p>
         </p:txBody>
@@ -7011,7 +5202,7 @@
               </a:defRPr>
             </a:pPr>
             <a:r>
-              <a:t>• 100/min/stream -&gt; 500 total: 0.59 MB/min (Kafka+Avro)</a:t>
+              <a:t>• maxAttempts = 3</a:t>
             </a:r>
           </a:p>
         </p:txBody>
@@ -7046,7 +5237,7 @@
               </a:defRPr>
             </a:pPr>
             <a:r>
-              <a:t>• 1K/min/stream -&gt; 5,000 total: 5.93 MB/min (Kafka+Avro)</a:t>
+              <a:t>• waitDuration = 300 ms base, exponential x2</a:t>
             </a:r>
           </a:p>
         </p:txBody>
@@ -7081,7 +5272,7 @@
               </a:defRPr>
             </a:pPr>
             <a:r>
-              <a:t>• 10K/min/stream -&gt; 50,000 total: 59.25 MB/min (Kafka+Avro)</a:t>
+              <a:t>• attemptNumber in response shows whether retry fired</a:t>
             </a:r>
           </a:p>
         </p:txBody>
@@ -7116,7 +5307,7 @@
               </a:defRPr>
             </a:pPr>
             <a:r>
-              <a:t>• 100K/min/stream -&gt; 500,000 total: 592.5 MB/min (Kafka+Avro)</a:t>
+              <a:t>• Exhaust all 3 attempts to trigger fallback</a:t>
             </a:r>
           </a:p>
         </p:txBody>
@@ -7124,6 +5315,41 @@
       <p:sp>
         <p:nvSpPr>
           <p:cNvPr id="8" name="TextBox 7"/>
+          <p:cNvSpPr txBox="1"/>
+          <p:nvPr/>
+        </p:nvSpPr>
+        <p:spPr>
+          <a:xfrm>
+            <a:off x="914400" y="4571999"/>
+            <a:ext cx="7772400" cy="274320"/>
+          </a:xfrm>
+          <a:prstGeom prst="rect">
+            <a:avLst/>
+          </a:prstGeom>
+          <a:noFill/>
+        </p:spPr>
+        <p:txBody>
+          <a:bodyPr wrap="none">
+            <a:spAutoFit/>
+          </a:bodyPr>
+          <a:lstStyle/>
+          <a:p>
+            <a:pPr>
+              <a:defRPr sz="1400">
+                <a:solidFill>
+                  <a:srgbClr val="E6EDF3"/>
+                </a:solidFill>
+              </a:defRPr>
+            </a:pPr>
+            <a:r>
+              <a:t>• Enable Flaky 50% fault to observe retries in action</a:t>
+            </a:r>
+          </a:p>
+        </p:txBody>
+      </p:sp>
+      <p:sp>
+        <p:nvSpPr>
+          <p:cNvPr id="9" name="TextBox 8"/>
           <p:cNvSpPr txBox="1"/>
           <p:nvPr/>
         </p:nvSpPr>
@@ -7151,7 +5377,7 @@
               </a:defRPr>
             </a:pPr>
             <a:r>
-              <a:t>6/18</a:t>
+              <a:t>6/11</a:t>
             </a:r>
           </a:p>
         </p:txBody>
@@ -7212,7 +5438,7 @@
               </a:defRPr>
             </a:pPr>
             <a:r>
-              <a:t>Bandwidth at Peak (100K msgs/min/stream)</a:t>
+              <a:t>RateLimiter and Bulkhead</a:t>
             </a:r>
           </a:p>
         </p:txBody>
@@ -7247,7 +5473,7 @@
               </a:defRPr>
             </a:pPr>
             <a:r>
-              <a:t>At 500K msgs/min across 5 streams:</a:t>
+              <a:t>Traffic shaping and concurrency control:</a:t>
             </a:r>
           </a:p>
         </p:txBody>
@@ -7282,7 +5508,7 @@
               </a:defRPr>
             </a:pPr>
             <a:r>
-              <a:t>• Kafka+Avro: 592.5 MB/min | 35.6 GB/hr | ~79 Mbps</a:t>
+              <a:t>• RateLimiter: 5 calls/s, 200 ms wait timeout</a:t>
             </a:r>
           </a:p>
         </p:txBody>
@@ -7317,7 +5543,7 @@
               </a:defRPr>
             </a:pPr>
             <a:r>
-              <a:t>• Pulsar+Avro: 625 MB/min | 37.5 GB/hr | ~83 Mbps</a:t>
+              <a:t>• Spam 20 -&gt; first 5 succeed, next 15 rejected</a:t>
             </a:r>
           </a:p>
         </p:txBody>
@@ -7352,7 +5578,7 @@
               </a:defRPr>
             </a:pPr>
             <a:r>
-              <a:t>• gRPC+Protobuf: 650 MB/min | 39 GB/hr | ~87 Mbps</a:t>
+              <a:t>• Bucket refills every second</a:t>
             </a:r>
           </a:p>
         </p:txBody>
@@ -7387,7 +5613,7 @@
               </a:defRPr>
             </a:pPr>
             <a:r>
-              <a:t>• REST+Protobuf: 950 MB/min | 57 GB/hr | ~127 Mbps</a:t>
+              <a:t>• Bulkhead: maxConcurrentCalls = 5</a:t>
             </a:r>
           </a:p>
         </p:txBody>
@@ -7422,7 +5648,7 @@
               </a:defRPr>
             </a:pPr>
             <a:r>
-              <a:t>• Kafka+Avro needs ~79 Mbps - well within 1 Gbps link</a:t>
+              <a:t>• Spam 10 concurrent + Slow 2s -&gt; 5 through, 5 rejected</a:t>
             </a:r>
           </a:p>
         </p:txBody>
@@ -7457,7 +5683,7 @@
               </a:defRPr>
             </a:pPr>
             <a:r>
-              <a:t>7/18</a:t>
+              <a:t>7/11</a:t>
             </a:r>
           </a:p>
         </p:txBody>
@@ -7518,7 +5744,7 @@
               </a:defRPr>
             </a:pPr>
             <a:r>
-              <a:t>3. Integration Options</a:t>
+              <a:t>TimeLimiter and Cache</a:t>
             </a:r>
           </a:p>
         </p:txBody>
@@ -7553,7 +5779,7 @@
               </a:defRPr>
             </a:pPr>
             <a:r>
-              <a:t>Three categories of integration approaches:</a:t>
+              <a:t>Async timeout and resilient caching:</a:t>
             </a:r>
           </a:p>
         </p:txBody>
@@ -7588,7 +5814,7 @@
               </a:defRPr>
             </a:pPr>
             <a:r>
-              <a:t>• Streaming: Kafka+Avro, Pulsar, Redpanda, NATS, RabbitMQ, Redis</a:t>
+              <a:t>• TimeLimiter: 1500 ms timeout on async call</a:t>
             </a:r>
           </a:p>
         </p:txBody>
@@ -7623,7 +5849,7 @@
               </a:defRPr>
             </a:pPr>
             <a:r>
-              <a:t>• API: gRPC+Protobuf, REST+Protobuf</a:t>
+              <a:t>• Force Timeout injects a 3 s delay -&gt; timeout fires</a:t>
             </a:r>
           </a:p>
         </p:txBody>
@@ -7658,7 +5884,7 @@
               </a:defRPr>
             </a:pPr>
             <a:r>
-              <a:t>• Database: Kafka Connect+CDC, Oracle GoldenGate, Data Guard</a:t>
+              <a:t>• Cache: TTL = 30 s (Caffeine)</a:t>
             </a:r>
           </a:p>
         </p:txBody>
@@ -7666,6 +5892,76 @@
       <p:sp>
         <p:nvSpPr>
           <p:cNvPr id="7" name="TextBox 6"/>
+          <p:cNvSpPr txBox="1"/>
+          <p:nvPr/>
+        </p:nvSpPr>
+        <p:spPr>
+          <a:xfrm>
+            <a:off x="914400" y="4251959"/>
+            <a:ext cx="7772400" cy="274320"/>
+          </a:xfrm>
+          <a:prstGeom prst="rect">
+            <a:avLst/>
+          </a:prstGeom>
+          <a:noFill/>
+        </p:spPr>
+        <p:txBody>
+          <a:bodyPr wrap="none">
+            <a:spAutoFit/>
+          </a:bodyPr>
+          <a:lstStyle/>
+          <a:p>
+            <a:pPr>
+              <a:defRPr sz="1400">
+                <a:solidFill>
+                  <a:srgbClr val="E6EDF3"/>
+                </a:solidFill>
+              </a:defRPr>
+            </a:pPr>
+            <a:r>
+              <a:t>• First call: misses=1, hits=0 (downstream called)</a:t>
+            </a:r>
+          </a:p>
+        </p:txBody>
+      </p:sp>
+      <p:sp>
+        <p:nvSpPr>
+          <p:cNvPr id="8" name="TextBox 7"/>
+          <p:cNvSpPr txBox="1"/>
+          <p:nvPr/>
+        </p:nvSpPr>
+        <p:spPr>
+          <a:xfrm>
+            <a:off x="914400" y="4571999"/>
+            <a:ext cx="7772400" cy="274320"/>
+          </a:xfrm>
+          <a:prstGeom prst="rect">
+            <a:avLst/>
+          </a:prstGeom>
+          <a:noFill/>
+        </p:spPr>
+        <p:txBody>
+          <a:bodyPr wrap="none">
+            <a:spAutoFit/>
+          </a:bodyPr>
+          <a:lstStyle/>
+          <a:p>
+            <a:pPr>
+              <a:defRPr sz="1400">
+                <a:solidFill>
+                  <a:srgbClr val="E6EDF3"/>
+                </a:solidFill>
+              </a:defRPr>
+            </a:pPr>
+            <a:r>
+              <a:t>• Second call: misses=1, hits=1 (from cache)</a:t>
+            </a:r>
+          </a:p>
+        </p:txBody>
+      </p:sp>
+      <p:sp>
+        <p:nvSpPr>
+          <p:cNvPr id="9" name="TextBox 8"/>
           <p:cNvSpPr txBox="1"/>
           <p:nvPr/>
         </p:nvSpPr>
@@ -7693,7 +5989,7 @@
               </a:defRPr>
             </a:pPr>
             <a:r>
-              <a:t>8/18</a:t>
+              <a:t>8/11</a:t>
             </a:r>
           </a:p>
         </p:txBody>
@@ -7733,74 +6029,64 @@
         <p:spPr>
           <a:xfrm>
             <a:off x="457200" y="365760"/>
-            <a:ext cx="2743200" cy="274320"/>
-          </a:xfrm>
-          <a:prstGeom prst="rect">
-            <a:avLst/>
-          </a:prstGeom>
-          <a:noFill/>
-        </p:spPr>
-        <p:txBody>
-          <a:bodyPr wrap="none">
-            <a:spAutoFit/>
-          </a:bodyPr>
-          <a:lstStyle/>
-          <a:p>
-            <a:pPr>
-              <a:defRPr sz="1000">
-                <a:solidFill>
-                  <a:srgbClr val="79C0FF"/>
-                </a:solidFill>
-              </a:defRPr>
-            </a:pPr>
-            <a:r>
-              <a:t>Code: TEXT</a:t>
-            </a:r>
-          </a:p>
-        </p:txBody>
-      </p:sp>
-      <p:sp>
-        <p:nvSpPr>
-          <p:cNvPr id="3" name="Rectangle 2"/>
-          <p:cNvSpPr/>
-          <p:nvPr/>
-        </p:nvSpPr>
-        <p:spPr>
-          <a:xfrm>
-            <a:off x="457200" y="914400"/>
-            <a:ext cx="8229600" cy="3657600"/>
-          </a:xfrm>
-          <a:prstGeom prst="rect">
-            <a:avLst/>
-          </a:prstGeom>
-          <a:solidFill>
-            <a:srgbClr val="0D1117"/>
-          </a:solidFill>
-          <a:ln>
-            <a:solidFill>
-              <a:srgbClr val="79C0FF"/>
-            </a:solidFill>
-          </a:ln>
-        </p:spPr>
-        <p:style>
-          <a:lnRef idx="1">
-            <a:schemeClr val="accent1"/>
-          </a:lnRef>
-          <a:fillRef idx="3">
-            <a:schemeClr val="accent1"/>
-          </a:fillRef>
-          <a:effectRef idx="2">
-            <a:schemeClr val="accent1"/>
-          </a:effectRef>
-          <a:fontRef idx="minor">
-            <a:schemeClr val="lt1"/>
-          </a:fontRef>
-        </p:style>
-        <p:txBody>
-          <a:bodyPr rtlCol="0" anchor="ctr"/>
-          <a:lstStyle/>
-          <a:p>
-            <a:pPr algn="ctr"/>
+            <a:ext cx="8229600" cy="731520"/>
+          </a:xfrm>
+          <a:prstGeom prst="rect">
+            <a:avLst/>
+          </a:prstGeom>
+          <a:noFill/>
+        </p:spPr>
+        <p:txBody>
+          <a:bodyPr wrap="none">
+            <a:spAutoFit/>
+          </a:bodyPr>
+          <a:lstStyle/>
+          <a:p>
+            <a:pPr>
+              <a:defRPr sz="4000" b="1">
+                <a:solidFill>
+                  <a:srgbClr val="58A6FF"/>
+                </a:solidFill>
+              </a:defRPr>
+            </a:pPr>
+            <a:r>
+              <a:t>Fault Injection Panel</a:t>
+            </a:r>
+          </a:p>
+        </p:txBody>
+      </p:sp>
+      <p:sp>
+        <p:nvSpPr>
+          <p:cNvPr id="3" name="TextBox 2"/>
+          <p:cNvSpPr txBox="1"/>
+          <p:nvPr/>
+        </p:nvSpPr>
+        <p:spPr>
+          <a:xfrm>
+            <a:off x="457200" y="1280160"/>
+            <a:ext cx="8229600" cy="1828800"/>
+          </a:xfrm>
+          <a:prstGeom prst="rect">
+            <a:avLst/>
+          </a:prstGeom>
+          <a:noFill/>
+        </p:spPr>
+        <p:txBody>
+          <a:bodyPr wrap="square">
+            <a:spAutoFit/>
+          </a:bodyPr>
+          <a:lstStyle/>
+          <a:p>
+            <a:pPr>
+              <a:defRPr sz="1800">
+                <a:solidFill>
+                  <a:srgbClr val="E6EDF3"/>
+                </a:solidFill>
+              </a:defRPr>
+            </a:pPr>
+            <a:r>
+              <a:t>Control downstream behaviour without restarting:</a:t>
+            </a:r>
           </a:p>
         </p:txBody>
       </p:sp>
@@ -7812,104 +6098,29 @@
         </p:nvSpPr>
         <p:spPr>
           <a:xfrm>
-            <a:off x="640080" y="1097280"/>
-            <a:ext cx="7863840" cy="3291840"/>
-          </a:xfrm>
-          <a:prstGeom prst="rect">
-            <a:avLst/>
-          </a:prstGeom>
-          <a:noFill/>
-        </p:spPr>
-        <p:txBody>
-          <a:bodyPr wrap="square" anchor="t">
-            <a:spAutoFit/>
-          </a:bodyPr>
-          <a:lstStyle/>
-          <a:p>
-            <a:pPr>
-              <a:defRPr sz="1000">
-                <a:solidFill>
-                  <a:srgbClr val="E6EDF3"/>
-                </a:solidFill>
-                <a:latin typeface="Monaco"/>
-              </a:defRPr>
-            </a:pPr>
-            <a:r>
-              <a:t>Oracle (Write DB)</a:t>
-            </a:r>
-            <a:br/>
-            <a:r>
-              <a:t>      |</a:t>
-            </a:r>
-            <a:br/>
-            <a:r>
-              <a:t>      v</a:t>
-            </a:r>
-            <a:br/>
-            <a:r>
-              <a:t>  CDC (Debezium / GoldenGate)</a:t>
-            </a:r>
-            <a:br/>
-            <a:r>
-              <a:t>      |</a:t>
-            </a:r>
-            <a:br/>
-            <a:r>
-              <a:t>      v</a:t>
-            </a:r>
-            <a:br/>
-            <a:r>
-              <a:t>  Kafka / Event Backbone</a:t>
-            </a:r>
-            <a:br/>
-            <a:r>
-              <a:t>      |</a:t>
-            </a:r>
-            <a:br/>
-            <a:r>
-              <a:t>      v</a:t>
-            </a:r>
-            <a:br/>
-            <a:r>
-              <a:t>Oracle (Read DB)</a:t>
-            </a:r>
-            <a:br/>
-            <a:br/>
-            <a:r>
-              <a:t>Guarantees:</a:t>
-            </a:r>
-            <a:br/>
-            <a:r>
-              <a:t>  - Idempotency</a:t>
-            </a:r>
-            <a:br/>
-            <a:r>
-              <a:t>  - Sequence numbers for ordering</a:t>
-            </a:r>
-            <a:br/>
-            <a:r>
-              <a:t>  - Schema Registry governance</a:t>
-            </a:r>
-            <a:br/>
-            <a:br/>
-            <a:r>
-              <a:t>Principles:</a:t>
-            </a:r>
-            <a:br/>
-            <a:r>
-              <a:t>  - Single writer</a:t>
-            </a:r>
-            <a:br/>
-            <a:r>
-              <a:t>  - Upsert sinks</a:t>
-            </a:r>
-            <a:br/>
-            <a:r>
-              <a:t>  - Replay capability</a:t>
-            </a:r>
-            <a:br/>
-            <a:r>
-              <a:t>...</a:t>
+            <a:off x="914400" y="3291840"/>
+            <a:ext cx="7772400" cy="274320"/>
+          </a:xfrm>
+          <a:prstGeom prst="rect">
+            <a:avLst/>
+          </a:prstGeom>
+          <a:noFill/>
+        </p:spPr>
+        <p:txBody>
+          <a:bodyPr wrap="none">
+            <a:spAutoFit/>
+          </a:bodyPr>
+          <a:lstStyle/>
+          <a:p>
+            <a:pPr>
+              <a:defRPr sz="1400">
+                <a:solidFill>
+                  <a:srgbClr val="E6EDF3"/>
+                </a:solidFill>
+              </a:defRPr>
+            </a:pPr>
+            <a:r>
+              <a:t>• Reset — all calls succeed normally</a:t>
             </a:r>
           </a:p>
         </p:txBody>
@@ -7917,6 +6128,146 @@
       <p:sp>
         <p:nvSpPr>
           <p:cNvPr id="5" name="TextBox 4"/>
+          <p:cNvSpPr txBox="1"/>
+          <p:nvPr/>
+        </p:nvSpPr>
+        <p:spPr>
+          <a:xfrm>
+            <a:off x="914400" y="3611880"/>
+            <a:ext cx="7772400" cy="274320"/>
+          </a:xfrm>
+          <a:prstGeom prst="rect">
+            <a:avLst/>
+          </a:prstGeom>
+          <a:noFill/>
+        </p:spPr>
+        <p:txBody>
+          <a:bodyPr wrap="none">
+            <a:spAutoFit/>
+          </a:bodyPr>
+          <a:lstStyle/>
+          <a:p>
+            <a:pPr>
+              <a:defRPr sz="1400">
+                <a:solidFill>
+                  <a:srgbClr val="E6EDF3"/>
+                </a:solidFill>
+              </a:defRPr>
+            </a:pPr>
+            <a:r>
+              <a:t>• Flaky 50% — 50% random error rate</a:t>
+            </a:r>
+          </a:p>
+        </p:txBody>
+      </p:sp>
+      <p:sp>
+        <p:nvSpPr>
+          <p:cNvPr id="6" name="TextBox 5"/>
+          <p:cNvSpPr txBox="1"/>
+          <p:nvPr/>
+        </p:nvSpPr>
+        <p:spPr>
+          <a:xfrm>
+            <a:off x="914400" y="3931920"/>
+            <a:ext cx="7772400" cy="274320"/>
+          </a:xfrm>
+          <a:prstGeom prst="rect">
+            <a:avLst/>
+          </a:prstGeom>
+          <a:noFill/>
+        </p:spPr>
+        <p:txBody>
+          <a:bodyPr wrap="none">
+            <a:spAutoFit/>
+          </a:bodyPr>
+          <a:lstStyle/>
+          <a:p>
+            <a:pPr>
+              <a:defRPr sz="1400">
+                <a:solidFill>
+                  <a:srgbClr val="E6EDF3"/>
+                </a:solidFill>
+              </a:defRPr>
+            </a:pPr>
+            <a:r>
+              <a:t>• Slow 2s — fixed 2-second delay</a:t>
+            </a:r>
+          </a:p>
+        </p:txBody>
+      </p:sp>
+      <p:sp>
+        <p:nvSpPr>
+          <p:cNvPr id="7" name="TextBox 6"/>
+          <p:cNvSpPr txBox="1"/>
+          <p:nvPr/>
+        </p:nvSpPr>
+        <p:spPr>
+          <a:xfrm>
+            <a:off x="914400" y="4251959"/>
+            <a:ext cx="7772400" cy="274320"/>
+          </a:xfrm>
+          <a:prstGeom prst="rect">
+            <a:avLst/>
+          </a:prstGeom>
+          <a:noFill/>
+        </p:spPr>
+        <p:txBody>
+          <a:bodyPr wrap="none">
+            <a:spAutoFit/>
+          </a:bodyPr>
+          <a:lstStyle/>
+          <a:p>
+            <a:pPr>
+              <a:defRPr sz="1400">
+                <a:solidFill>
+                  <a:srgbClr val="E6EDF3"/>
+                </a:solidFill>
+              </a:defRPr>
+            </a:pPr>
+            <a:r>
+              <a:t>• Force Timeout — 3-second delay (exceeds 1.5 s limit)</a:t>
+            </a:r>
+          </a:p>
+        </p:txBody>
+      </p:sp>
+      <p:sp>
+        <p:nvSpPr>
+          <p:cNvPr id="8" name="TextBox 7"/>
+          <p:cNvSpPr txBox="1"/>
+          <p:nvPr/>
+        </p:nvSpPr>
+        <p:spPr>
+          <a:xfrm>
+            <a:off x="914400" y="4571999"/>
+            <a:ext cx="7772400" cy="274320"/>
+          </a:xfrm>
+          <a:prstGeom prst="rect">
+            <a:avLst/>
+          </a:prstGeom>
+          <a:noFill/>
+        </p:spPr>
+        <p:txBody>
+          <a:bodyPr wrap="none">
+            <a:spAutoFit/>
+          </a:bodyPr>
+          <a:lstStyle/>
+          <a:p>
+            <a:pPr>
+              <a:defRPr sz="1400">
+                <a:solidFill>
+                  <a:srgbClr val="E6EDF3"/>
+                </a:solidFill>
+              </a:defRPr>
+            </a:pPr>
+            <a:r>
+              <a:t>• Force HTTP 500 — every call returns 500</a:t>
+            </a:r>
+          </a:p>
+        </p:txBody>
+      </p:sp>
+      <p:sp>
+        <p:nvSpPr>
+          <p:cNvPr id="9" name="TextBox 8"/>
           <p:cNvSpPr txBox="1"/>
           <p:nvPr/>
         </p:nvSpPr>
@@ -7944,7 +6295,7 @@
               </a:defRPr>
             </a:pPr>
             <a:r>
-              <a:t>9/18</a:t>
+              <a:t>9/11</a:t>
             </a:r>
           </a:p>
         </p:txBody>

</xml_diff>